<commit_message>
feat: session08 scripts and slide added
</commit_message>
<xml_diff>
--- a/nestjs/nestjs-08.pptx
+++ b/nestjs/nestjs-08.pptx
@@ -5,16 +5,24 @@
     <p:sldMasterId id="2147483705" r:id="rId1"/>
   </p:sldMasterIdLst>
   <p:notesMasterIdLst>
-    <p:notesMasterId r:id="rId9"/>
+    <p:notesMasterId r:id="rId17"/>
   </p:notesMasterIdLst>
   <p:sldIdLst>
     <p:sldId id="259" r:id="rId2"/>
     <p:sldId id="296" r:id="rId3"/>
-    <p:sldId id="339" r:id="rId4"/>
-    <p:sldId id="345" r:id="rId5"/>
-    <p:sldId id="346" r:id="rId6"/>
-    <p:sldId id="340" r:id="rId7"/>
-    <p:sldId id="320" r:id="rId8"/>
+    <p:sldId id="340" r:id="rId4"/>
+    <p:sldId id="339" r:id="rId5"/>
+    <p:sldId id="345" r:id="rId6"/>
+    <p:sldId id="346" r:id="rId7"/>
+    <p:sldId id="348" r:id="rId8"/>
+    <p:sldId id="347" r:id="rId9"/>
+    <p:sldId id="349" r:id="rId10"/>
+    <p:sldId id="350" r:id="rId11"/>
+    <p:sldId id="351" r:id="rId12"/>
+    <p:sldId id="352" r:id="rId13"/>
+    <p:sldId id="353" r:id="rId14"/>
+    <p:sldId id="354" r:id="rId15"/>
+    <p:sldId id="320" r:id="rId16"/>
   </p:sldIdLst>
   <p:sldSz cx="12192000" cy="6858000"/>
   <p:notesSz cx="6858000" cy="9144000"/>
@@ -203,7 +211,7 @@
           <a:p>
             <a:fld id="{9B9ECB28-6A22-4037-9487-F3F739F744D6}" type="datetimeFigureOut">
               <a:rPr lang="en-US" smtClean="0"/>
-              <a:t>1/31/2022</a:t>
+              <a:t>2/1/2022</a:t>
             </a:fld>
             <a:endParaRPr lang="en-US"/>
           </a:p>
@@ -541,7 +549,7 @@
           <a:p>
             <a:fld id="{0FE84E6F-3671-472C-BE6F-A37BC298F4AB}" type="slidenum">
               <a:rPr lang="en-US" smtClean="0"/>
-              <a:t>6</a:t>
+              <a:t>3</a:t>
             </a:fld>
             <a:endParaRPr lang="en-US"/>
           </a:p>
@@ -605,6 +613,288 @@
           <a:lstStyle/>
           <a:p>
             <a:r>
+              <a:rPr lang="en-US" b="0" dirty="0">
+                <a:solidFill>
+                  <a:srgbClr val="9CDCFE"/>
+                </a:solidFill>
+                <a:effectLst/>
+                <a:latin typeface="Consolas" panose="020B0609020204030204" pitchFamily="49" charset="0"/>
+              </a:rPr>
+              <a:t>"</a:t>
+            </a:r>
+            <a:r>
+              <a:rPr lang="en-US" b="0" dirty="0" err="1">
+                <a:solidFill>
+                  <a:srgbClr val="9CDCFE"/>
+                </a:solidFill>
+                <a:effectLst/>
+                <a:latin typeface="Consolas" panose="020B0609020204030204" pitchFamily="49" charset="0"/>
+              </a:rPr>
+              <a:t>compilerOptions</a:t>
+            </a:r>
+            <a:r>
+              <a:rPr lang="en-US" b="0" dirty="0">
+                <a:solidFill>
+                  <a:srgbClr val="9CDCFE"/>
+                </a:solidFill>
+                <a:effectLst/>
+                <a:latin typeface="Consolas" panose="020B0609020204030204" pitchFamily="49" charset="0"/>
+              </a:rPr>
+              <a:t>"</a:t>
+            </a:r>
+            <a:r>
+              <a:rPr lang="en-US" b="0" dirty="0">
+                <a:solidFill>
+                  <a:srgbClr val="D4D4D4"/>
+                </a:solidFill>
+                <a:effectLst/>
+                <a:latin typeface="Consolas" panose="020B0609020204030204" pitchFamily="49" charset="0"/>
+              </a:rPr>
+              <a:t>: {</a:t>
+            </a:r>
+          </a:p>
+          <a:p>
+            <a:r>
+              <a:rPr lang="en-US" b="0" dirty="0">
+                <a:solidFill>
+                  <a:srgbClr val="D4D4D4"/>
+                </a:solidFill>
+                <a:effectLst/>
+                <a:latin typeface="Consolas" panose="020B0609020204030204" pitchFamily="49" charset="0"/>
+              </a:rPr>
+              <a:t>    </a:t>
+            </a:r>
+            <a:r>
+              <a:rPr lang="en-US" b="0" dirty="0">
+                <a:solidFill>
+                  <a:srgbClr val="9CDCFE"/>
+                </a:solidFill>
+                <a:effectLst/>
+                <a:latin typeface="Consolas" panose="020B0609020204030204" pitchFamily="49" charset="0"/>
+              </a:rPr>
+              <a:t>"</a:t>
+            </a:r>
+            <a:r>
+              <a:rPr lang="en-US" b="0" dirty="0" err="1">
+                <a:solidFill>
+                  <a:srgbClr val="9CDCFE"/>
+                </a:solidFill>
+                <a:effectLst/>
+                <a:latin typeface="Consolas" panose="020B0609020204030204" pitchFamily="49" charset="0"/>
+              </a:rPr>
+              <a:t>deleteOutDir</a:t>
+            </a:r>
+            <a:r>
+              <a:rPr lang="en-US" b="0" dirty="0">
+                <a:solidFill>
+                  <a:srgbClr val="9CDCFE"/>
+                </a:solidFill>
+                <a:effectLst/>
+                <a:latin typeface="Consolas" panose="020B0609020204030204" pitchFamily="49" charset="0"/>
+              </a:rPr>
+              <a:t>"</a:t>
+            </a:r>
+            <a:r>
+              <a:rPr lang="en-US" b="0" dirty="0">
+                <a:solidFill>
+                  <a:srgbClr val="D4D4D4"/>
+                </a:solidFill>
+                <a:effectLst/>
+                <a:latin typeface="Consolas" panose="020B0609020204030204" pitchFamily="49" charset="0"/>
+              </a:rPr>
+              <a:t>: </a:t>
+            </a:r>
+            <a:r>
+              <a:rPr lang="en-US" b="0" dirty="0">
+                <a:solidFill>
+                  <a:srgbClr val="569CD6"/>
+                </a:solidFill>
+                <a:effectLst/>
+                <a:latin typeface="Consolas" panose="020B0609020204030204" pitchFamily="49" charset="0"/>
+              </a:rPr>
+              <a:t>true</a:t>
+            </a:r>
+            <a:r>
+              <a:rPr lang="en-US" b="0" dirty="0">
+                <a:solidFill>
+                  <a:srgbClr val="D4D4D4"/>
+                </a:solidFill>
+                <a:effectLst/>
+                <a:latin typeface="Consolas" panose="020B0609020204030204" pitchFamily="49" charset="0"/>
+              </a:rPr>
+              <a:t>,</a:t>
+            </a:r>
+          </a:p>
+          <a:p>
+            <a:r>
+              <a:rPr lang="en-US" b="0" dirty="0">
+                <a:solidFill>
+                  <a:srgbClr val="D4D4D4"/>
+                </a:solidFill>
+                <a:effectLst/>
+                <a:latin typeface="Consolas" panose="020B0609020204030204" pitchFamily="49" charset="0"/>
+              </a:rPr>
+              <a:t>    </a:t>
+            </a:r>
+            <a:r>
+              <a:rPr lang="en-US" b="0" dirty="0">
+                <a:solidFill>
+                  <a:srgbClr val="9CDCFE"/>
+                </a:solidFill>
+                <a:effectLst/>
+                <a:latin typeface="Consolas" panose="020B0609020204030204" pitchFamily="49" charset="0"/>
+              </a:rPr>
+              <a:t>"plugins"</a:t>
+            </a:r>
+            <a:r>
+              <a:rPr lang="en-US" b="0" dirty="0">
+                <a:solidFill>
+                  <a:srgbClr val="D4D4D4"/>
+                </a:solidFill>
+                <a:effectLst/>
+                <a:latin typeface="Consolas" panose="020B0609020204030204" pitchFamily="49" charset="0"/>
+              </a:rPr>
+              <a:t>: [</a:t>
+            </a:r>
+            <a:r>
+              <a:rPr lang="en-US" b="0" dirty="0">
+                <a:solidFill>
+                  <a:srgbClr val="CE9178"/>
+                </a:solidFill>
+                <a:effectLst/>
+                <a:latin typeface="Consolas" panose="020B0609020204030204" pitchFamily="49" charset="0"/>
+              </a:rPr>
+              <a:t>"@</a:t>
+            </a:r>
+            <a:r>
+              <a:rPr lang="en-US" b="0" dirty="0" err="1">
+                <a:solidFill>
+                  <a:srgbClr val="CE9178"/>
+                </a:solidFill>
+                <a:effectLst/>
+                <a:latin typeface="Consolas" panose="020B0609020204030204" pitchFamily="49" charset="0"/>
+              </a:rPr>
+              <a:t>nestjs</a:t>
+            </a:r>
+            <a:r>
+              <a:rPr lang="en-US" b="0" dirty="0">
+                <a:solidFill>
+                  <a:srgbClr val="CE9178"/>
+                </a:solidFill>
+                <a:effectLst/>
+                <a:latin typeface="Consolas" panose="020B0609020204030204" pitchFamily="49" charset="0"/>
+              </a:rPr>
+              <a:t>/swagger/plugin"</a:t>
+            </a:r>
+            <a:r>
+              <a:rPr lang="en-US" b="0" dirty="0">
+                <a:solidFill>
+                  <a:srgbClr val="D4D4D4"/>
+                </a:solidFill>
+                <a:effectLst/>
+                <a:latin typeface="Consolas" panose="020B0609020204030204" pitchFamily="49" charset="0"/>
+              </a:rPr>
+              <a:t>]</a:t>
+            </a:r>
+          </a:p>
+          <a:p>
+            <a:r>
+              <a:rPr lang="en-US" b="0" dirty="0">
+                <a:solidFill>
+                  <a:srgbClr val="D4D4D4"/>
+                </a:solidFill>
+                <a:effectLst/>
+                <a:latin typeface="Consolas" panose="020B0609020204030204" pitchFamily="49" charset="0"/>
+              </a:rPr>
+              <a:t>  }</a:t>
+            </a:r>
+          </a:p>
+          <a:p>
+            <a:endParaRPr lang="en-US" dirty="0"/>
+          </a:p>
+        </p:txBody>
+      </p:sp>
+      <p:sp>
+        <p:nvSpPr>
+          <p:cNvPr id="4" name="Slide Number Placeholder 3"/>
+          <p:cNvSpPr>
+            <a:spLocks noGrp="1"/>
+          </p:cNvSpPr>
+          <p:nvPr>
+            <p:ph type="sldNum" sz="quarter" idx="5"/>
+          </p:nvPr>
+        </p:nvSpPr>
+        <p:spPr/>
+        <p:txBody>
+          <a:bodyPr/>
+          <a:lstStyle/>
+          <a:p>
+            <a:fld id="{0FE84E6F-3671-472C-BE6F-A37BC298F4AB}" type="slidenum">
+              <a:rPr lang="en-US" smtClean="0"/>
+              <a:t>12</a:t>
+            </a:fld>
+            <a:endParaRPr lang="en-US"/>
+          </a:p>
+        </p:txBody>
+      </p:sp>
+    </p:spTree>
+    <p:extLst>
+      <p:ext uri="{BB962C8B-B14F-4D97-AF65-F5344CB8AC3E}">
+        <p14:creationId xmlns:p14="http://schemas.microsoft.com/office/powerpoint/2010/main" val="395177476"/>
+      </p:ext>
+    </p:extLst>
+  </p:cSld>
+  <p:clrMapOvr>
+    <a:masterClrMapping/>
+  </p:clrMapOvr>
+</p:notes>
+</file>
+
+<file path=ppt/notesSlides/notesSlide3.xml><?xml version="1.0" encoding="utf-8"?>
+<p:notes xmlns:a="http://schemas.openxmlformats.org/drawingml/2006/main" xmlns:r="http://schemas.openxmlformats.org/officeDocument/2006/relationships" xmlns:p="http://schemas.openxmlformats.org/presentationml/2006/main">
+  <p:cSld>
+    <p:spTree>
+      <p:nvGrpSpPr>
+        <p:cNvPr id="1" name=""/>
+        <p:cNvGrpSpPr/>
+        <p:nvPr/>
+      </p:nvGrpSpPr>
+      <p:grpSpPr>
+        <a:xfrm>
+          <a:off x="0" y="0"/>
+          <a:ext cx="0" cy="0"/>
+          <a:chOff x="0" y="0"/>
+          <a:chExt cx="0" cy="0"/>
+        </a:xfrm>
+      </p:grpSpPr>
+      <p:sp>
+        <p:nvSpPr>
+          <p:cNvPr id="2" name="Slide Image Placeholder 1"/>
+          <p:cNvSpPr>
+            <a:spLocks noGrp="1" noRot="1" noChangeAspect="1"/>
+          </p:cNvSpPr>
+          <p:nvPr>
+            <p:ph type="sldImg"/>
+          </p:nvPr>
+        </p:nvSpPr>
+        <p:spPr/>
+      </p:sp>
+      <p:sp>
+        <p:nvSpPr>
+          <p:cNvPr id="3" name="Notes Placeholder 2"/>
+          <p:cNvSpPr>
+            <a:spLocks noGrp="1"/>
+          </p:cNvSpPr>
+          <p:nvPr>
+            <p:ph type="body" idx="1"/>
+          </p:nvPr>
+        </p:nvSpPr>
+        <p:spPr/>
+        <p:txBody>
+          <a:bodyPr/>
+          <a:lstStyle/>
+          <a:p>
+            <a:r>
               <a:rPr lang="en-US" dirty="0"/>
               <a:t>Hint: </a:t>
             </a:r>
@@ -684,7 +974,7 @@
           <a:p>
             <a:fld id="{0FE84E6F-3671-472C-BE6F-A37BC298F4AB}" type="slidenum">
               <a:rPr lang="en-US" smtClean="0"/>
-              <a:t>7</a:t>
+              <a:t>15</a:t>
             </a:fld>
             <a:endParaRPr lang="en-US"/>
           </a:p>
@@ -887,7 +1177,7 @@
           <a:p>
             <a:fld id="{19B6F524-99F3-4BEA-ACD7-976EF4D36657}" type="datetime1">
               <a:rPr lang="en-US" smtClean="0"/>
-              <a:t>1/31/2022</a:t>
+              <a:t>2/1/2022</a:t>
             </a:fld>
             <a:endParaRPr lang="en-US" dirty="0"/>
           </a:p>
@@ -1196,7 +1486,7 @@
           <a:p>
             <a:fld id="{2145C3A9-05D9-428D-9788-A7F14838F6F9}" type="datetime1">
               <a:rPr lang="en-US" smtClean="0"/>
-              <a:t>1/31/2022</a:t>
+              <a:t>2/1/2022</a:t>
             </a:fld>
             <a:endParaRPr lang="en-US" dirty="0"/>
           </a:p>
@@ -1394,7 +1684,7 @@
           <a:p>
             <a:fld id="{82C701FB-B03E-4981-A9F8-99B474DD173A}" type="datetime1">
               <a:rPr lang="en-US" smtClean="0"/>
-              <a:t>1/31/2022</a:t>
+              <a:t>2/1/2022</a:t>
             </a:fld>
             <a:endParaRPr lang="en-US" dirty="0"/>
           </a:p>
@@ -1661,7 +1951,7 @@
           <a:p>
             <a:fld id="{7A7E8EF3-CBF7-4EB9-B6E5-3754574E3433}" type="datetime1">
               <a:rPr lang="en-US" smtClean="0"/>
-              <a:t>1/31/2022</a:t>
+              <a:t>2/1/2022</a:t>
             </a:fld>
             <a:endParaRPr lang="en-US" dirty="0"/>
           </a:p>
@@ -2101,7 +2391,7 @@
           <a:p>
             <a:fld id="{DA8A4A96-31AC-487C-9F15-1822D58542B7}" type="datetime1">
               <a:rPr lang="en-US" smtClean="0"/>
-              <a:t>1/31/2022</a:t>
+              <a:t>2/1/2022</a:t>
             </a:fld>
             <a:endParaRPr lang="en-US" dirty="0"/>
           </a:p>
@@ -2642,7 +2932,7 @@
           <a:p>
             <a:fld id="{FBBF9546-09C4-4F24-A284-5B81FF8659B4}" type="datetime1">
               <a:rPr lang="en-US" smtClean="0"/>
-              <a:t>1/31/2022</a:t>
+              <a:t>2/1/2022</a:t>
             </a:fld>
             <a:endParaRPr lang="en-US" dirty="0"/>
           </a:p>
@@ -3528,7 +3818,7 @@
           <a:p>
             <a:fld id="{5BF4405D-15A5-450B-B053-484859B9C8F7}" type="datetime1">
               <a:rPr lang="en-US" smtClean="0"/>
-              <a:t>1/31/2022</a:t>
+              <a:t>2/1/2022</a:t>
             </a:fld>
             <a:endParaRPr lang="en-US" dirty="0"/>
           </a:p>
@@ -3702,7 +3992,7 @@
           <a:p>
             <a:fld id="{E0366559-EC21-40C1-8A65-9A3B4EA78391}" type="datetime1">
               <a:rPr lang="en-US" smtClean="0"/>
-              <a:t>1/31/2022</a:t>
+              <a:t>2/1/2022</a:t>
             </a:fld>
             <a:endParaRPr lang="en-US" dirty="0"/>
           </a:p>
@@ -3890,7 +4180,7 @@
           <a:p>
             <a:fld id="{4F09CA92-695C-4FFA-8E37-4D2C288BCC04}" type="datetime1">
               <a:rPr lang="en-US" smtClean="0"/>
-              <a:t>1/31/2022</a:t>
+              <a:t>2/1/2022</a:t>
             </a:fld>
             <a:endParaRPr lang="en-US" dirty="0"/>
           </a:p>
@@ -4064,7 +4354,7 @@
           <a:p>
             <a:fld id="{CA551262-FC07-4FE4-9221-F72F7D4F209A}" type="datetime1">
               <a:rPr lang="en-US" smtClean="0"/>
-              <a:t>1/31/2022</a:t>
+              <a:t>2/1/2022</a:t>
             </a:fld>
             <a:endParaRPr lang="en-US" dirty="0"/>
           </a:p>
@@ -4312,7 +4602,7 @@
           <a:p>
             <a:fld id="{46A321E4-8899-4F7D-BEB1-BD52626ABD8D}" type="datetime1">
               <a:rPr lang="en-US" smtClean="0"/>
-              <a:t>1/31/2022</a:t>
+              <a:t>2/1/2022</a:t>
             </a:fld>
             <a:endParaRPr lang="en-US" dirty="0"/>
           </a:p>
@@ -4558,7 +4848,7 @@
           <a:p>
             <a:fld id="{B53F6DFA-8A0E-4513-867D-18B9AA66B23C}" type="datetime1">
               <a:rPr lang="en-US" smtClean="0"/>
-              <a:t>1/31/2022</a:t>
+              <a:t>2/1/2022</a:t>
             </a:fld>
             <a:endParaRPr lang="en-US" dirty="0"/>
           </a:p>
@@ -5045,7 +5335,7 @@
           <a:p>
             <a:fld id="{154283A7-B9AC-454B-A468-44B75A398B49}" type="datetime1">
               <a:rPr lang="en-US" smtClean="0"/>
-              <a:t>1/31/2022</a:t>
+              <a:t>2/1/2022</a:t>
             </a:fld>
             <a:endParaRPr lang="en-US" dirty="0"/>
           </a:p>
@@ -5167,7 +5457,7 @@
           <a:p>
             <a:fld id="{A3F8184D-DEDD-48A0-9ACA-5F6ED9EFE5B8}" type="datetime1">
               <a:rPr lang="en-US" smtClean="0"/>
-              <a:t>1/31/2022</a:t>
+              <a:t>2/1/2022</a:t>
             </a:fld>
             <a:endParaRPr lang="en-US" dirty="0"/>
           </a:p>
@@ -5266,7 +5556,7 @@
           <a:p>
             <a:fld id="{BF38AC0E-F520-48F3-BA14-8BAB82D735FB}" type="datetime1">
               <a:rPr lang="en-US" smtClean="0"/>
-              <a:t>1/31/2022</a:t>
+              <a:t>2/1/2022</a:t>
             </a:fld>
             <a:endParaRPr lang="en-US" dirty="0"/>
           </a:p>
@@ -5525,7 +5815,7 @@
           <a:p>
             <a:fld id="{317D0F2A-2724-4AD4-BF4C-A7B1910D9412}" type="datetime1">
               <a:rPr lang="en-US" smtClean="0"/>
-              <a:t>1/31/2022</a:t>
+              <a:t>2/1/2022</a:t>
             </a:fld>
             <a:endParaRPr lang="en-US" dirty="0"/>
           </a:p>
@@ -5836,7 +6126,7 @@
           <a:p>
             <a:fld id="{9A0B82A5-4A21-4F82-91DB-989CE997E82E}" type="datetime1">
               <a:rPr lang="en-US" smtClean="0"/>
-              <a:t>1/31/2022</a:t>
+              <a:t>2/1/2022</a:t>
             </a:fld>
             <a:endParaRPr lang="en-US" dirty="0"/>
           </a:p>
@@ -6073,7 +6363,7 @@
           <a:p>
             <a:fld id="{01BFEF8A-AE08-4951-B923-589F814B0C31}" type="datetime1">
               <a:rPr lang="en-US" smtClean="0"/>
-              <a:t>1/31/2022</a:t>
+              <a:t>2/1/2022</a:t>
             </a:fld>
             <a:endParaRPr lang="en-US" dirty="0"/>
           </a:p>
@@ -6909,6 +7199,1479 @@
 </p:sld>
 </file>
 
+<file path=ppt/slides/slide10.xml><?xml version="1.0" encoding="utf-8"?>
+<p:sld xmlns:a="http://schemas.openxmlformats.org/drawingml/2006/main" xmlns:r="http://schemas.openxmlformats.org/officeDocument/2006/relationships" xmlns:p="http://schemas.openxmlformats.org/presentationml/2006/main">
+  <p:cSld>
+    <p:spTree>
+      <p:nvGrpSpPr>
+        <p:cNvPr id="1" name=""/>
+        <p:cNvGrpSpPr/>
+        <p:nvPr/>
+      </p:nvGrpSpPr>
+      <p:grpSpPr>
+        <a:xfrm>
+          <a:off x="0" y="0"/>
+          <a:ext cx="0" cy="0"/>
+          <a:chOff x="0" y="0"/>
+          <a:chExt cx="0" cy="0"/>
+        </a:xfrm>
+      </p:grpSpPr>
+      <p:sp>
+        <p:nvSpPr>
+          <p:cNvPr id="2" name="Title 1">
+            <a:extLst>
+              <a:ext uri="{FF2B5EF4-FFF2-40B4-BE49-F238E27FC236}">
+                <a16:creationId xmlns:a16="http://schemas.microsoft.com/office/drawing/2014/main" id="{86C135AD-8DB0-4BAB-8508-789F39FCF343}"/>
+              </a:ext>
+            </a:extLst>
+          </p:cNvPr>
+          <p:cNvSpPr>
+            <a:spLocks noGrp="1"/>
+          </p:cNvSpPr>
+          <p:nvPr>
+            <p:ph type="title"/>
+          </p:nvPr>
+        </p:nvSpPr>
+        <p:spPr/>
+        <p:txBody>
+          <a:bodyPr/>
+          <a:lstStyle/>
+          <a:p>
+            <a:r>
+              <a:rPr lang="en-US" dirty="0" err="1"/>
+              <a:t>OpenApi</a:t>
+            </a:r>
+            <a:r>
+              <a:rPr lang="en-US" dirty="0"/>
+              <a:t> Specification</a:t>
+            </a:r>
+          </a:p>
+        </p:txBody>
+      </p:sp>
+      <p:sp>
+        <p:nvSpPr>
+          <p:cNvPr id="3" name="Content Placeholder 2">
+            <a:extLst>
+              <a:ext uri="{FF2B5EF4-FFF2-40B4-BE49-F238E27FC236}">
+                <a16:creationId xmlns:a16="http://schemas.microsoft.com/office/drawing/2014/main" id="{D922BB48-0EE4-41B7-BA3D-65AF9DE0B6E5}"/>
+              </a:ext>
+            </a:extLst>
+          </p:cNvPr>
+          <p:cNvSpPr>
+            <a:spLocks noGrp="1"/>
+          </p:cNvSpPr>
+          <p:nvPr>
+            <p:ph idx="1"/>
+          </p:nvPr>
+        </p:nvSpPr>
+        <p:spPr/>
+        <p:txBody>
+          <a:bodyPr/>
+          <a:lstStyle/>
+          <a:p>
+            <a:r>
+              <a:rPr lang="en-US" dirty="0"/>
+              <a:t>It is somehow, a language agnostic definition format, useful for describing </a:t>
+            </a:r>
+            <a:r>
+              <a:rPr lang="en-US" dirty="0" err="1"/>
+              <a:t>RESTFul</a:t>
+            </a:r>
+            <a:r>
+              <a:rPr lang="en-US" dirty="0"/>
+              <a:t> </a:t>
+            </a:r>
+            <a:r>
+              <a:rPr lang="en-US" dirty="0" err="1"/>
+              <a:t>apis</a:t>
+            </a:r>
+            <a:r>
+              <a:rPr lang="en-US" dirty="0"/>
+              <a:t>.</a:t>
+            </a:r>
+          </a:p>
+          <a:p>
+            <a:r>
+              <a:rPr lang="en-US" dirty="0"/>
+              <a:t>We can describe our </a:t>
+            </a:r>
+            <a:r>
+              <a:rPr lang="en-US" dirty="0" err="1"/>
+              <a:t>api</a:t>
+            </a:r>
+            <a:r>
+              <a:rPr lang="en-US" dirty="0"/>
+              <a:t>:</a:t>
+            </a:r>
+          </a:p>
+          <a:p>
+            <a:pPr lvl="1"/>
+            <a:r>
+              <a:rPr lang="en-US" dirty="0"/>
+              <a:t>Operations</a:t>
+            </a:r>
+          </a:p>
+          <a:p>
+            <a:pPr lvl="1"/>
+            <a:r>
+              <a:rPr lang="en-US" dirty="0"/>
+              <a:t>Input parameters</a:t>
+            </a:r>
+          </a:p>
+          <a:p>
+            <a:pPr lvl="1"/>
+            <a:r>
+              <a:rPr lang="en-US" dirty="0"/>
+              <a:t>Responses</a:t>
+            </a:r>
+          </a:p>
+          <a:p>
+            <a:pPr lvl="1"/>
+            <a:r>
+              <a:rPr lang="en-US" dirty="0"/>
+              <a:t>Authentication</a:t>
+            </a:r>
+          </a:p>
+          <a:p>
+            <a:r>
+              <a:rPr lang="en-US" dirty="0"/>
+              <a:t>Nest provide a dedicate module: </a:t>
+            </a:r>
+            <a:r>
+              <a:rPr lang="en-US" sz="2100" dirty="0" err="1">
+                <a:latin typeface="Consolas" panose="020B0609020204030204" pitchFamily="49" charset="0"/>
+              </a:rPr>
+              <a:t>SwaggerModule</a:t>
+            </a:r>
+            <a:endParaRPr lang="en-US" sz="2100" dirty="0">
+              <a:latin typeface="Consolas" panose="020B0609020204030204" pitchFamily="49" charset="0"/>
+            </a:endParaRPr>
+          </a:p>
+          <a:p>
+            <a:pPr lvl="1"/>
+            <a:r>
+              <a:rPr lang="en-US" dirty="0" err="1">
+                <a:latin typeface="Consolas" panose="020B0609020204030204" pitchFamily="49" charset="0"/>
+              </a:rPr>
+              <a:t>npm</a:t>
+            </a:r>
+            <a:r>
+              <a:rPr lang="en-US" dirty="0">
+                <a:latin typeface="Consolas" panose="020B0609020204030204" pitchFamily="49" charset="0"/>
+              </a:rPr>
+              <a:t> install @nestjs/swagger swagger-</a:t>
+            </a:r>
+            <a:r>
+              <a:rPr lang="en-US" dirty="0" err="1">
+                <a:latin typeface="Consolas" panose="020B0609020204030204" pitchFamily="49" charset="0"/>
+              </a:rPr>
+              <a:t>ui</a:t>
+            </a:r>
+            <a:r>
+              <a:rPr lang="en-US" dirty="0">
+                <a:latin typeface="Consolas" panose="020B0609020204030204" pitchFamily="49" charset="0"/>
+              </a:rPr>
+              <a:t>-express</a:t>
+            </a:r>
+          </a:p>
+          <a:p>
+            <a:pPr lvl="1"/>
+            <a:endParaRPr lang="en-US" dirty="0"/>
+          </a:p>
+        </p:txBody>
+      </p:sp>
+      <p:sp>
+        <p:nvSpPr>
+          <p:cNvPr id="4" name="Footer Placeholder 3">
+            <a:extLst>
+              <a:ext uri="{FF2B5EF4-FFF2-40B4-BE49-F238E27FC236}">
+                <a16:creationId xmlns:a16="http://schemas.microsoft.com/office/drawing/2014/main" id="{C7B793BB-13E0-4E1F-A70C-A316D891F4A2}"/>
+              </a:ext>
+            </a:extLst>
+          </p:cNvPr>
+          <p:cNvSpPr>
+            <a:spLocks noGrp="1"/>
+          </p:cNvSpPr>
+          <p:nvPr>
+            <p:ph type="ftr" sz="quarter" idx="11"/>
+          </p:nvPr>
+        </p:nvSpPr>
+        <p:spPr/>
+        <p:txBody>
+          <a:bodyPr/>
+          <a:lstStyle/>
+          <a:p>
+            <a:r>
+              <a:rPr lang="en-US"/>
+              <a:t>Nodejs Basics</a:t>
+            </a:r>
+            <a:endParaRPr lang="en-US" dirty="0"/>
+          </a:p>
+        </p:txBody>
+      </p:sp>
+      <p:sp>
+        <p:nvSpPr>
+          <p:cNvPr id="5" name="Slide Number Placeholder 4">
+            <a:extLst>
+              <a:ext uri="{FF2B5EF4-FFF2-40B4-BE49-F238E27FC236}">
+                <a16:creationId xmlns:a16="http://schemas.microsoft.com/office/drawing/2014/main" id="{087C2F8A-0182-4056-B767-95E5A5593972}"/>
+              </a:ext>
+            </a:extLst>
+          </p:cNvPr>
+          <p:cNvSpPr>
+            <a:spLocks noGrp="1"/>
+          </p:cNvSpPr>
+          <p:nvPr>
+            <p:ph type="sldNum" sz="quarter" idx="12"/>
+          </p:nvPr>
+        </p:nvSpPr>
+        <p:spPr/>
+        <p:txBody>
+          <a:bodyPr/>
+          <a:lstStyle/>
+          <a:p>
+            <a:fld id="{3A98EE3D-8CD1-4C3F-BD1C-C98C9596463C}" type="slidenum">
+              <a:rPr lang="en-US" smtClean="0"/>
+              <a:t>10</a:t>
+            </a:fld>
+            <a:endParaRPr lang="en-US" dirty="0"/>
+          </a:p>
+        </p:txBody>
+      </p:sp>
+    </p:spTree>
+    <p:extLst>
+      <p:ext uri="{BB962C8B-B14F-4D97-AF65-F5344CB8AC3E}">
+        <p14:creationId xmlns:p14="http://schemas.microsoft.com/office/powerpoint/2010/main" val="1524796252"/>
+      </p:ext>
+    </p:extLst>
+  </p:cSld>
+  <p:clrMapOvr>
+    <a:masterClrMapping/>
+  </p:clrMapOvr>
+</p:sld>
+</file>
+
+<file path=ppt/slides/slide11.xml><?xml version="1.0" encoding="utf-8"?>
+<p:sld xmlns:a="http://schemas.openxmlformats.org/drawingml/2006/main" xmlns:r="http://schemas.openxmlformats.org/officeDocument/2006/relationships" xmlns:p="http://schemas.openxmlformats.org/presentationml/2006/main">
+  <p:cSld>
+    <p:spTree>
+      <p:nvGrpSpPr>
+        <p:cNvPr id="1" name=""/>
+        <p:cNvGrpSpPr/>
+        <p:nvPr/>
+      </p:nvGrpSpPr>
+      <p:grpSpPr>
+        <a:xfrm>
+          <a:off x="0" y="0"/>
+          <a:ext cx="0" cy="0"/>
+          <a:chOff x="0" y="0"/>
+          <a:chExt cx="0" cy="0"/>
+        </a:xfrm>
+      </p:grpSpPr>
+      <p:sp>
+        <p:nvSpPr>
+          <p:cNvPr id="2" name="Title 1">
+            <a:extLst>
+              <a:ext uri="{FF2B5EF4-FFF2-40B4-BE49-F238E27FC236}">
+                <a16:creationId xmlns:a16="http://schemas.microsoft.com/office/drawing/2014/main" id="{50708CC2-6098-421A-ACD9-BD13518F2211}"/>
+              </a:ext>
+            </a:extLst>
+          </p:cNvPr>
+          <p:cNvSpPr>
+            <a:spLocks noGrp="1"/>
+          </p:cNvSpPr>
+          <p:nvPr>
+            <p:ph type="title"/>
+          </p:nvPr>
+        </p:nvSpPr>
+        <p:spPr/>
+        <p:txBody>
+          <a:bodyPr/>
+          <a:lstStyle/>
+          <a:p>
+            <a:r>
+              <a:rPr lang="en-US" dirty="0"/>
+              <a:t>Demo</a:t>
+            </a:r>
+          </a:p>
+        </p:txBody>
+      </p:sp>
+      <p:sp>
+        <p:nvSpPr>
+          <p:cNvPr id="3" name="Content Placeholder 2">
+            <a:extLst>
+              <a:ext uri="{FF2B5EF4-FFF2-40B4-BE49-F238E27FC236}">
+                <a16:creationId xmlns:a16="http://schemas.microsoft.com/office/drawing/2014/main" id="{4DF04835-6DF1-462D-8C6E-751E5B2AA806}"/>
+              </a:ext>
+            </a:extLst>
+          </p:cNvPr>
+          <p:cNvSpPr>
+            <a:spLocks noGrp="1"/>
+          </p:cNvSpPr>
+          <p:nvPr>
+            <p:ph idx="1"/>
+          </p:nvPr>
+        </p:nvSpPr>
+        <p:spPr/>
+        <p:txBody>
+          <a:bodyPr>
+            <a:normAutofit fontScale="92500" lnSpcReduction="20000"/>
+          </a:bodyPr>
+          <a:lstStyle/>
+          <a:p>
+            <a:r>
+              <a:rPr lang="en-US" dirty="0"/>
+              <a:t>Run the </a:t>
+            </a:r>
+            <a:r>
+              <a:rPr lang="en-US" dirty="0" err="1"/>
+              <a:t>ui</a:t>
+            </a:r>
+            <a:endParaRPr lang="en-US" dirty="0"/>
+          </a:p>
+          <a:p>
+            <a:pPr lvl="1"/>
+            <a:r>
+              <a:rPr lang="en-US" sz="2300" dirty="0" err="1">
+                <a:latin typeface="Consolas" panose="020B0609020204030204" pitchFamily="49" charset="0"/>
+              </a:rPr>
+              <a:t>DocumentBuilder</a:t>
+            </a:r>
+            <a:r>
+              <a:rPr lang="en-US" dirty="0"/>
+              <a:t> is our tool </a:t>
+            </a:r>
+            <a:r>
+              <a:rPr lang="en-US" dirty="0">
+                <a:sym typeface="Wingdings" panose="05000000000000000000" pitchFamily="2" charset="2"/>
+              </a:rPr>
+              <a:t></a:t>
+            </a:r>
+          </a:p>
+          <a:p>
+            <a:pPr lvl="1"/>
+            <a:r>
+              <a:rPr lang="en-US" dirty="0">
+                <a:sym typeface="Wingdings" panose="05000000000000000000" pitchFamily="2" charset="2"/>
+              </a:rPr>
+              <a:t>It sets the swagger properties (options)</a:t>
+            </a:r>
+          </a:p>
+          <a:p>
+            <a:pPr lvl="2"/>
+            <a:r>
+              <a:rPr lang="en-US" dirty="0">
+                <a:sym typeface="Wingdings" panose="05000000000000000000" pitchFamily="2" charset="2"/>
+              </a:rPr>
+              <a:t>Title</a:t>
+            </a:r>
+          </a:p>
+          <a:p>
+            <a:pPr lvl="2"/>
+            <a:r>
+              <a:rPr lang="en-US" dirty="0">
+                <a:sym typeface="Wingdings" panose="05000000000000000000" pitchFamily="2" charset="2"/>
+              </a:rPr>
+              <a:t>Description</a:t>
+            </a:r>
+          </a:p>
+          <a:p>
+            <a:pPr lvl="2"/>
+            <a:r>
+              <a:rPr lang="en-US" dirty="0">
+                <a:sym typeface="Wingdings" panose="05000000000000000000" pitchFamily="2" charset="2"/>
+              </a:rPr>
+              <a:t>Version</a:t>
+            </a:r>
+          </a:p>
+          <a:p>
+            <a:pPr lvl="2"/>
+            <a:r>
+              <a:rPr lang="en-US" dirty="0">
+                <a:sym typeface="Wingdings" panose="05000000000000000000" pitchFamily="2" charset="2"/>
+              </a:rPr>
+              <a:t>And finally </a:t>
+            </a:r>
+            <a:r>
+              <a:rPr lang="en-US" sz="2300" dirty="0">
+                <a:latin typeface="Consolas" panose="020B0609020204030204" pitchFamily="49" charset="0"/>
+                <a:sym typeface="Wingdings" panose="05000000000000000000" pitchFamily="2" charset="2"/>
+              </a:rPr>
+              <a:t>build()</a:t>
+            </a:r>
+          </a:p>
+          <a:p>
+            <a:pPr lvl="2"/>
+            <a:r>
+              <a:rPr lang="en-US" sz="2300" dirty="0">
+                <a:latin typeface="Consolas" panose="020B0609020204030204" pitchFamily="49" charset="0"/>
+                <a:sym typeface="Wingdings" panose="05000000000000000000" pitchFamily="2" charset="2"/>
+              </a:rPr>
+              <a:t>const options = new </a:t>
+            </a:r>
+            <a:r>
+              <a:rPr lang="en-US" sz="2300" dirty="0" err="1">
+                <a:latin typeface="Consolas" panose="020B0609020204030204" pitchFamily="49" charset="0"/>
+                <a:sym typeface="Wingdings" panose="05000000000000000000" pitchFamily="2" charset="2"/>
+              </a:rPr>
+              <a:t>DocumentBuilder</a:t>
+            </a:r>
+            <a:r>
+              <a:rPr lang="en-US" sz="2300" dirty="0">
+                <a:latin typeface="Consolas" panose="020B0609020204030204" pitchFamily="49" charset="0"/>
+                <a:sym typeface="Wingdings" panose="05000000000000000000" pitchFamily="2" charset="2"/>
+              </a:rPr>
+              <a:t>().</a:t>
+            </a:r>
+            <a:r>
+              <a:rPr lang="en-US" sz="2300" dirty="0" err="1">
+                <a:latin typeface="Consolas" panose="020B0609020204030204" pitchFamily="49" charset="0"/>
+                <a:sym typeface="Wingdings" panose="05000000000000000000" pitchFamily="2" charset="2"/>
+              </a:rPr>
+              <a:t>setTitle</a:t>
+            </a:r>
+            <a:r>
+              <a:rPr lang="en-US" sz="2300" dirty="0">
+                <a:latin typeface="Consolas" panose="020B0609020204030204" pitchFamily="49" charset="0"/>
+                <a:sym typeface="Wingdings" panose="05000000000000000000" pitchFamily="2" charset="2"/>
+              </a:rPr>
+              <a:t>()…</a:t>
+            </a:r>
+          </a:p>
+          <a:p>
+            <a:pPr lvl="1"/>
+            <a:r>
+              <a:rPr lang="en-US" dirty="0">
+                <a:sym typeface="Wingdings" panose="05000000000000000000" pitchFamily="2" charset="2"/>
+              </a:rPr>
+              <a:t>Then create the document by this options</a:t>
+            </a:r>
+          </a:p>
+          <a:p>
+            <a:pPr lvl="2"/>
+            <a:r>
+              <a:rPr lang="en-US" sz="2300" dirty="0">
+                <a:latin typeface="Consolas" panose="020B0609020204030204" pitchFamily="49" charset="0"/>
+                <a:sym typeface="Wingdings" panose="05000000000000000000" pitchFamily="2" charset="2"/>
+              </a:rPr>
+              <a:t>const document = </a:t>
+            </a:r>
+            <a:r>
+              <a:rPr lang="en-US" sz="2300" dirty="0" err="1">
+                <a:latin typeface="Consolas" panose="020B0609020204030204" pitchFamily="49" charset="0"/>
+                <a:sym typeface="Wingdings" panose="05000000000000000000" pitchFamily="2" charset="2"/>
+              </a:rPr>
+              <a:t>SwaggerModule.createDocument</a:t>
+            </a:r>
+            <a:r>
+              <a:rPr lang="en-US" sz="2300" dirty="0">
+                <a:latin typeface="Consolas" panose="020B0609020204030204" pitchFamily="49" charset="0"/>
+                <a:sym typeface="Wingdings" panose="05000000000000000000" pitchFamily="2" charset="2"/>
+              </a:rPr>
+              <a:t>(app, options);</a:t>
+            </a:r>
+          </a:p>
+          <a:p>
+            <a:pPr lvl="1"/>
+            <a:r>
+              <a:rPr lang="en-US" dirty="0">
+                <a:sym typeface="Wingdings" panose="05000000000000000000" pitchFamily="2" charset="2"/>
+              </a:rPr>
+              <a:t>Then wire all of them together</a:t>
+            </a:r>
+          </a:p>
+          <a:p>
+            <a:pPr lvl="2"/>
+            <a:r>
+              <a:rPr lang="en-US" sz="2300" dirty="0" err="1">
+                <a:latin typeface="Consolas" panose="020B0609020204030204" pitchFamily="49" charset="0"/>
+                <a:sym typeface="Wingdings" panose="05000000000000000000" pitchFamily="2" charset="2"/>
+              </a:rPr>
+              <a:t>SwaggerModule.setup</a:t>
+            </a:r>
+            <a:r>
+              <a:rPr lang="en-US" sz="2300" dirty="0">
+                <a:latin typeface="Consolas" panose="020B0609020204030204" pitchFamily="49" charset="0"/>
+                <a:sym typeface="Wingdings" panose="05000000000000000000" pitchFamily="2" charset="2"/>
+              </a:rPr>
+              <a:t>(‘docs’, app, document);</a:t>
+            </a:r>
+            <a:endParaRPr lang="en-US" sz="2300" dirty="0">
+              <a:latin typeface="Consolas" panose="020B0609020204030204" pitchFamily="49" charset="0"/>
+            </a:endParaRPr>
+          </a:p>
+        </p:txBody>
+      </p:sp>
+      <p:sp>
+        <p:nvSpPr>
+          <p:cNvPr id="4" name="Footer Placeholder 3">
+            <a:extLst>
+              <a:ext uri="{FF2B5EF4-FFF2-40B4-BE49-F238E27FC236}">
+                <a16:creationId xmlns:a16="http://schemas.microsoft.com/office/drawing/2014/main" id="{4566B0BE-5A44-47CF-8903-477784177459}"/>
+              </a:ext>
+            </a:extLst>
+          </p:cNvPr>
+          <p:cNvSpPr>
+            <a:spLocks noGrp="1"/>
+          </p:cNvSpPr>
+          <p:nvPr>
+            <p:ph type="ftr" sz="quarter" idx="11"/>
+          </p:nvPr>
+        </p:nvSpPr>
+        <p:spPr/>
+        <p:txBody>
+          <a:bodyPr/>
+          <a:lstStyle/>
+          <a:p>
+            <a:r>
+              <a:rPr lang="en-US"/>
+              <a:t>Nodejs Basics</a:t>
+            </a:r>
+            <a:endParaRPr lang="en-US" dirty="0"/>
+          </a:p>
+        </p:txBody>
+      </p:sp>
+      <p:sp>
+        <p:nvSpPr>
+          <p:cNvPr id="5" name="Slide Number Placeholder 4">
+            <a:extLst>
+              <a:ext uri="{FF2B5EF4-FFF2-40B4-BE49-F238E27FC236}">
+                <a16:creationId xmlns:a16="http://schemas.microsoft.com/office/drawing/2014/main" id="{1A13965C-1362-4A08-83E5-609EFDB03480}"/>
+              </a:ext>
+            </a:extLst>
+          </p:cNvPr>
+          <p:cNvSpPr>
+            <a:spLocks noGrp="1"/>
+          </p:cNvSpPr>
+          <p:nvPr>
+            <p:ph type="sldNum" sz="quarter" idx="12"/>
+          </p:nvPr>
+        </p:nvSpPr>
+        <p:spPr/>
+        <p:txBody>
+          <a:bodyPr/>
+          <a:lstStyle/>
+          <a:p>
+            <a:fld id="{3A98EE3D-8CD1-4C3F-BD1C-C98C9596463C}" type="slidenum">
+              <a:rPr lang="en-US" smtClean="0"/>
+              <a:t>11</a:t>
+            </a:fld>
+            <a:endParaRPr lang="en-US" dirty="0"/>
+          </a:p>
+        </p:txBody>
+      </p:sp>
+    </p:spTree>
+    <p:extLst>
+      <p:ext uri="{BB962C8B-B14F-4D97-AF65-F5344CB8AC3E}">
+        <p14:creationId xmlns:p14="http://schemas.microsoft.com/office/powerpoint/2010/main" val="812806851"/>
+      </p:ext>
+    </p:extLst>
+  </p:cSld>
+  <p:clrMapOvr>
+    <a:masterClrMapping/>
+  </p:clrMapOvr>
+</p:sld>
+</file>
+
+<file path=ppt/slides/slide12.xml><?xml version="1.0" encoding="utf-8"?>
+<p:sld xmlns:a="http://schemas.openxmlformats.org/drawingml/2006/main" xmlns:r="http://schemas.openxmlformats.org/officeDocument/2006/relationships" xmlns:p="http://schemas.openxmlformats.org/presentationml/2006/main">
+  <p:cSld>
+    <p:spTree>
+      <p:nvGrpSpPr>
+        <p:cNvPr id="1" name=""/>
+        <p:cNvGrpSpPr/>
+        <p:nvPr/>
+      </p:nvGrpSpPr>
+      <p:grpSpPr>
+        <a:xfrm>
+          <a:off x="0" y="0"/>
+          <a:ext cx="0" cy="0"/>
+          <a:chOff x="0" y="0"/>
+          <a:chExt cx="0" cy="0"/>
+        </a:xfrm>
+      </p:grpSpPr>
+      <p:sp>
+        <p:nvSpPr>
+          <p:cNvPr id="2" name="Title 1">
+            <a:extLst>
+              <a:ext uri="{FF2B5EF4-FFF2-40B4-BE49-F238E27FC236}">
+                <a16:creationId xmlns:a16="http://schemas.microsoft.com/office/drawing/2014/main" id="{145A5040-A968-4F17-9AD7-56315F507F7F}"/>
+              </a:ext>
+            </a:extLst>
+          </p:cNvPr>
+          <p:cNvSpPr>
+            <a:spLocks noGrp="1"/>
+          </p:cNvSpPr>
+          <p:nvPr>
+            <p:ph type="title"/>
+          </p:nvPr>
+        </p:nvSpPr>
+        <p:spPr/>
+        <p:txBody>
+          <a:bodyPr/>
+          <a:lstStyle/>
+          <a:p>
+            <a:r>
+              <a:rPr lang="en-US" dirty="0"/>
+              <a:t>Demo</a:t>
+            </a:r>
+          </a:p>
+        </p:txBody>
+      </p:sp>
+      <p:sp>
+        <p:nvSpPr>
+          <p:cNvPr id="3" name="Content Placeholder 2">
+            <a:extLst>
+              <a:ext uri="{FF2B5EF4-FFF2-40B4-BE49-F238E27FC236}">
+                <a16:creationId xmlns:a16="http://schemas.microsoft.com/office/drawing/2014/main" id="{BDFA09D0-E2FA-4EF4-8F13-6557F23301FB}"/>
+              </a:ext>
+            </a:extLst>
+          </p:cNvPr>
+          <p:cNvSpPr>
+            <a:spLocks noGrp="1"/>
+          </p:cNvSpPr>
+          <p:nvPr>
+            <p:ph idx="1"/>
+          </p:nvPr>
+        </p:nvSpPr>
+        <p:spPr/>
+        <p:txBody>
+          <a:bodyPr/>
+          <a:lstStyle/>
+          <a:p>
+            <a:r>
+              <a:rPr lang="en-US" dirty="0"/>
+              <a:t>Oh, maybe you have some issue with swagger@5</a:t>
+            </a:r>
+          </a:p>
+          <a:p>
+            <a:pPr lvl="1"/>
+            <a:r>
+              <a:rPr lang="fr-FR" dirty="0" err="1">
+                <a:latin typeface="Consolas" panose="020B0609020204030204" pitchFamily="49" charset="0"/>
+              </a:rPr>
+              <a:t>nest</a:t>
+            </a:r>
+            <a:r>
+              <a:rPr lang="fr-FR" dirty="0">
+                <a:latin typeface="Consolas" panose="020B0609020204030204" pitchFamily="49" charset="0"/>
+              </a:rPr>
+              <a:t> update -f -t </a:t>
+            </a:r>
+            <a:r>
+              <a:rPr lang="fr-FR" dirty="0" err="1">
+                <a:latin typeface="Consolas" panose="020B0609020204030204" pitchFamily="49" charset="0"/>
+              </a:rPr>
+              <a:t>latest</a:t>
+            </a:r>
+            <a:r>
+              <a:rPr lang="fr-FR" dirty="0"/>
+              <a:t>, fix </a:t>
+            </a:r>
+            <a:r>
+              <a:rPr lang="fr-FR" dirty="0" err="1"/>
+              <a:t>everything</a:t>
+            </a:r>
+            <a:r>
+              <a:rPr lang="fr-FR" dirty="0"/>
+              <a:t> </a:t>
+            </a:r>
+            <a:r>
+              <a:rPr lang="fr-FR" dirty="0">
+                <a:sym typeface="Wingdings" panose="05000000000000000000" pitchFamily="2" charset="2"/>
+              </a:rPr>
+              <a:t></a:t>
+            </a:r>
+          </a:p>
+          <a:p>
+            <a:r>
+              <a:rPr lang="fr-FR" dirty="0" err="1">
+                <a:sym typeface="Wingdings" panose="05000000000000000000" pitchFamily="2" charset="2"/>
+              </a:rPr>
+              <a:t>We</a:t>
+            </a:r>
+            <a:r>
+              <a:rPr lang="fr-FR" dirty="0">
+                <a:sym typeface="Wingdings" panose="05000000000000000000" pitchFamily="2" charset="2"/>
+              </a:rPr>
+              <a:t> </a:t>
+            </a:r>
+            <a:r>
+              <a:rPr lang="fr-FR" dirty="0" err="1">
+                <a:sym typeface="Wingdings" panose="05000000000000000000" pitchFamily="2" charset="2"/>
+              </a:rPr>
+              <a:t>don’t</a:t>
+            </a:r>
+            <a:r>
+              <a:rPr lang="fr-FR" dirty="0">
+                <a:sym typeface="Wingdings" panose="05000000000000000000" pitchFamily="2" charset="2"/>
+              </a:rPr>
+              <a:t> </a:t>
+            </a:r>
+            <a:r>
+              <a:rPr lang="fr-FR" dirty="0" err="1">
+                <a:sym typeface="Wingdings" panose="05000000000000000000" pitchFamily="2" charset="2"/>
+              </a:rPr>
+              <a:t>see</a:t>
+            </a:r>
+            <a:r>
+              <a:rPr lang="fr-FR" dirty="0">
+                <a:sym typeface="Wingdings" panose="05000000000000000000" pitchFamily="2" charset="2"/>
+              </a:rPr>
+              <a:t> </a:t>
+            </a:r>
+            <a:r>
+              <a:rPr lang="fr-FR" dirty="0" err="1">
+                <a:sym typeface="Wingdings" panose="05000000000000000000" pitchFamily="2" charset="2"/>
+              </a:rPr>
+              <a:t>any</a:t>
+            </a:r>
+            <a:r>
+              <a:rPr lang="fr-FR" dirty="0">
+                <a:sym typeface="Wingdings" panose="05000000000000000000" pitchFamily="2" charset="2"/>
+              </a:rPr>
+              <a:t> information about </a:t>
+            </a:r>
+            <a:r>
+              <a:rPr lang="fr-FR" dirty="0" err="1">
+                <a:sym typeface="Wingdings" panose="05000000000000000000" pitchFamily="2" charset="2"/>
+              </a:rPr>
+              <a:t>our</a:t>
+            </a:r>
+            <a:r>
+              <a:rPr lang="fr-FR" dirty="0">
+                <a:sym typeface="Wingdings" panose="05000000000000000000" pitchFamily="2" charset="2"/>
+              </a:rPr>
+              <a:t> </a:t>
+            </a:r>
+            <a:r>
+              <a:rPr lang="fr-FR" dirty="0" err="1">
+                <a:sym typeface="Wingdings" panose="05000000000000000000" pitchFamily="2" charset="2"/>
+              </a:rPr>
+              <a:t>dtos</a:t>
+            </a:r>
+            <a:r>
+              <a:rPr lang="fr-FR" dirty="0">
+                <a:sym typeface="Wingdings" panose="05000000000000000000" pitchFamily="2" charset="2"/>
+              </a:rPr>
+              <a:t> in </a:t>
+            </a:r>
+            <a:r>
+              <a:rPr lang="fr-FR" dirty="0" err="1">
+                <a:sym typeface="Wingdings" panose="05000000000000000000" pitchFamily="2" charset="2"/>
+              </a:rPr>
+              <a:t>swagger</a:t>
+            </a:r>
+            <a:r>
+              <a:rPr lang="fr-FR" dirty="0">
+                <a:sym typeface="Wingdings" panose="05000000000000000000" pitchFamily="2" charset="2"/>
+              </a:rPr>
+              <a:t> UI, </a:t>
+            </a:r>
+            <a:r>
+              <a:rPr lang="fr-FR" dirty="0" err="1">
+                <a:sym typeface="Wingdings" panose="05000000000000000000" pitchFamily="2" charset="2"/>
+              </a:rPr>
+              <a:t>why</a:t>
+            </a:r>
+            <a:r>
+              <a:rPr lang="fr-FR" dirty="0">
+                <a:sym typeface="Wingdings" panose="05000000000000000000" pitchFamily="2" charset="2"/>
+              </a:rPr>
+              <a:t>?</a:t>
+            </a:r>
+          </a:p>
+          <a:p>
+            <a:pPr lvl="1"/>
+            <a:r>
+              <a:rPr lang="en-US" dirty="0"/>
+              <a:t>Typescript metadata reflection system has several limitation to determine:</a:t>
+            </a:r>
+          </a:p>
+          <a:p>
+            <a:pPr lvl="2"/>
+            <a:r>
+              <a:rPr lang="en-US" dirty="0"/>
+              <a:t>What properties a class consist of</a:t>
+            </a:r>
+          </a:p>
+          <a:p>
+            <a:pPr lvl="2"/>
+            <a:r>
+              <a:rPr lang="en-US" dirty="0"/>
+              <a:t>Or a property required or not</a:t>
+            </a:r>
+          </a:p>
+          <a:p>
+            <a:pPr lvl="1"/>
+            <a:r>
+              <a:rPr lang="en-US" dirty="0"/>
+              <a:t>We can declare them manually but</a:t>
+            </a:r>
+          </a:p>
+          <a:p>
+            <a:pPr lvl="2"/>
+            <a:r>
+              <a:rPr lang="en-US" dirty="0"/>
+              <a:t>We can fix some of them at compilation time:</a:t>
+            </a:r>
+          </a:p>
+          <a:p>
+            <a:pPr lvl="3"/>
+            <a:r>
+              <a:rPr lang="en-US" dirty="0"/>
+              <a:t>Some </a:t>
+            </a:r>
+            <a:r>
+              <a:rPr lang="en-US" dirty="0" err="1"/>
+              <a:t>compilerOptions</a:t>
+            </a:r>
+            <a:r>
+              <a:rPr lang="en-US" dirty="0"/>
+              <a:t> inside </a:t>
+            </a:r>
+            <a:r>
+              <a:rPr lang="en-US" sz="2100" dirty="0">
+                <a:latin typeface="Consolas" panose="020B0609020204030204" pitchFamily="49" charset="0"/>
+              </a:rPr>
+              <a:t>nest-</a:t>
+            </a:r>
+            <a:r>
+              <a:rPr lang="en-US" sz="2100" dirty="0" err="1">
+                <a:latin typeface="Consolas" panose="020B0609020204030204" pitchFamily="49" charset="0"/>
+              </a:rPr>
+              <a:t>cli.json</a:t>
+            </a:r>
+            <a:endParaRPr lang="en-US" sz="2100" dirty="0">
+              <a:latin typeface="Consolas" panose="020B0609020204030204" pitchFamily="49" charset="0"/>
+            </a:endParaRPr>
+          </a:p>
+          <a:p>
+            <a:pPr lvl="2"/>
+            <a:endParaRPr lang="en-US" dirty="0"/>
+          </a:p>
+        </p:txBody>
+      </p:sp>
+      <p:sp>
+        <p:nvSpPr>
+          <p:cNvPr id="4" name="Footer Placeholder 3">
+            <a:extLst>
+              <a:ext uri="{FF2B5EF4-FFF2-40B4-BE49-F238E27FC236}">
+                <a16:creationId xmlns:a16="http://schemas.microsoft.com/office/drawing/2014/main" id="{A4552721-E03A-4F63-96EC-2DDD021A82AC}"/>
+              </a:ext>
+            </a:extLst>
+          </p:cNvPr>
+          <p:cNvSpPr>
+            <a:spLocks noGrp="1"/>
+          </p:cNvSpPr>
+          <p:nvPr>
+            <p:ph type="ftr" sz="quarter" idx="11"/>
+          </p:nvPr>
+        </p:nvSpPr>
+        <p:spPr/>
+        <p:txBody>
+          <a:bodyPr/>
+          <a:lstStyle/>
+          <a:p>
+            <a:r>
+              <a:rPr lang="en-US"/>
+              <a:t>Nodejs Basics</a:t>
+            </a:r>
+            <a:endParaRPr lang="en-US" dirty="0"/>
+          </a:p>
+        </p:txBody>
+      </p:sp>
+      <p:sp>
+        <p:nvSpPr>
+          <p:cNvPr id="5" name="Slide Number Placeholder 4">
+            <a:extLst>
+              <a:ext uri="{FF2B5EF4-FFF2-40B4-BE49-F238E27FC236}">
+                <a16:creationId xmlns:a16="http://schemas.microsoft.com/office/drawing/2014/main" id="{7DAAFE3A-4223-47DB-A019-1A147F6C1831}"/>
+              </a:ext>
+            </a:extLst>
+          </p:cNvPr>
+          <p:cNvSpPr>
+            <a:spLocks noGrp="1"/>
+          </p:cNvSpPr>
+          <p:nvPr>
+            <p:ph type="sldNum" sz="quarter" idx="12"/>
+          </p:nvPr>
+        </p:nvSpPr>
+        <p:spPr/>
+        <p:txBody>
+          <a:bodyPr/>
+          <a:lstStyle/>
+          <a:p>
+            <a:fld id="{3A98EE3D-8CD1-4C3F-BD1C-C98C9596463C}" type="slidenum">
+              <a:rPr lang="en-US" smtClean="0"/>
+              <a:t>12</a:t>
+            </a:fld>
+            <a:endParaRPr lang="en-US" dirty="0"/>
+          </a:p>
+        </p:txBody>
+      </p:sp>
+    </p:spTree>
+    <p:extLst>
+      <p:ext uri="{BB962C8B-B14F-4D97-AF65-F5344CB8AC3E}">
+        <p14:creationId xmlns:p14="http://schemas.microsoft.com/office/powerpoint/2010/main" val="2646532045"/>
+      </p:ext>
+    </p:extLst>
+  </p:cSld>
+  <p:clrMapOvr>
+    <a:masterClrMapping/>
+  </p:clrMapOvr>
+</p:sld>
+</file>
+
+<file path=ppt/slides/slide13.xml><?xml version="1.0" encoding="utf-8"?>
+<p:sld xmlns:a="http://schemas.openxmlformats.org/drawingml/2006/main" xmlns:r="http://schemas.openxmlformats.org/officeDocument/2006/relationships" xmlns:p="http://schemas.openxmlformats.org/presentationml/2006/main">
+  <p:cSld>
+    <p:spTree>
+      <p:nvGrpSpPr>
+        <p:cNvPr id="1" name=""/>
+        <p:cNvGrpSpPr/>
+        <p:nvPr/>
+      </p:nvGrpSpPr>
+      <p:grpSpPr>
+        <a:xfrm>
+          <a:off x="0" y="0"/>
+          <a:ext cx="0" cy="0"/>
+          <a:chOff x="0" y="0"/>
+          <a:chExt cx="0" cy="0"/>
+        </a:xfrm>
+      </p:grpSpPr>
+      <p:sp>
+        <p:nvSpPr>
+          <p:cNvPr id="2" name="Title 1">
+            <a:extLst>
+              <a:ext uri="{FF2B5EF4-FFF2-40B4-BE49-F238E27FC236}">
+                <a16:creationId xmlns:a16="http://schemas.microsoft.com/office/drawing/2014/main" id="{5CD1F783-76BF-46A1-97FD-D548F6F4F2E8}"/>
+              </a:ext>
+            </a:extLst>
+          </p:cNvPr>
+          <p:cNvSpPr>
+            <a:spLocks noGrp="1"/>
+          </p:cNvSpPr>
+          <p:nvPr>
+            <p:ph type="title"/>
+          </p:nvPr>
+        </p:nvSpPr>
+        <p:spPr/>
+        <p:txBody>
+          <a:bodyPr/>
+          <a:lstStyle/>
+          <a:p>
+            <a:r>
+              <a:rPr lang="en-US" dirty="0"/>
+              <a:t>Demo</a:t>
+            </a:r>
+          </a:p>
+        </p:txBody>
+      </p:sp>
+      <p:sp>
+        <p:nvSpPr>
+          <p:cNvPr id="3" name="Content Placeholder 2">
+            <a:extLst>
+              <a:ext uri="{FF2B5EF4-FFF2-40B4-BE49-F238E27FC236}">
+                <a16:creationId xmlns:a16="http://schemas.microsoft.com/office/drawing/2014/main" id="{1D0C8D7A-256B-451A-8CB8-D0424C467E50}"/>
+              </a:ext>
+            </a:extLst>
+          </p:cNvPr>
+          <p:cNvSpPr>
+            <a:spLocks noGrp="1"/>
+          </p:cNvSpPr>
+          <p:nvPr>
+            <p:ph idx="1"/>
+          </p:nvPr>
+        </p:nvSpPr>
+        <p:spPr/>
+        <p:txBody>
+          <a:bodyPr/>
+          <a:lstStyle/>
+          <a:p>
+            <a:r>
+              <a:rPr lang="en-US" dirty="0"/>
+              <a:t>How to be more descriptive:</a:t>
+            </a:r>
+          </a:p>
+          <a:p>
+            <a:pPr lvl="1"/>
+            <a:r>
+              <a:rPr lang="en-US" dirty="0">
+                <a:latin typeface="Consolas" panose="020B0609020204030204" pitchFamily="49" charset="0"/>
+              </a:rPr>
+              <a:t>@ApiProperty()</a:t>
+            </a:r>
+          </a:p>
+          <a:p>
+            <a:pPr lvl="2"/>
+            <a:r>
+              <a:rPr lang="en-US" dirty="0"/>
+              <a:t>Default</a:t>
+            </a:r>
+          </a:p>
+          <a:p>
+            <a:pPr lvl="2"/>
+            <a:r>
+              <a:rPr lang="en-US" dirty="0"/>
+              <a:t>Description</a:t>
+            </a:r>
+          </a:p>
+          <a:p>
+            <a:pPr lvl="2"/>
+            <a:r>
+              <a:rPr lang="en-US" dirty="0"/>
+              <a:t>…</a:t>
+            </a:r>
+          </a:p>
+          <a:p>
+            <a:pPr lvl="1"/>
+            <a:r>
+              <a:rPr lang="en-US" dirty="0">
+                <a:latin typeface="Consolas" panose="020B0609020204030204" pitchFamily="49" charset="0"/>
+              </a:rPr>
+              <a:t>@ApiResponse()</a:t>
+            </a:r>
+          </a:p>
+          <a:p>
+            <a:pPr lvl="2"/>
+            <a:r>
+              <a:rPr lang="en-US" dirty="0"/>
+              <a:t>Additional responses</a:t>
+            </a:r>
+          </a:p>
+          <a:p>
+            <a:pPr lvl="3"/>
+            <a:r>
+              <a:rPr lang="en-US" dirty="0"/>
+              <a:t>Like exceptions</a:t>
+            </a:r>
+          </a:p>
+          <a:p>
+            <a:pPr lvl="2"/>
+            <a:r>
+              <a:rPr lang="en-US" sz="2100" dirty="0">
+                <a:latin typeface="Consolas" panose="020B0609020204030204" pitchFamily="49" charset="0"/>
+              </a:rPr>
+              <a:t>@ApiForbiddenResponse</a:t>
+            </a:r>
+          </a:p>
+          <a:p>
+            <a:pPr lvl="2"/>
+            <a:endParaRPr lang="en-US" dirty="0"/>
+          </a:p>
+        </p:txBody>
+      </p:sp>
+      <p:sp>
+        <p:nvSpPr>
+          <p:cNvPr id="4" name="Footer Placeholder 3">
+            <a:extLst>
+              <a:ext uri="{FF2B5EF4-FFF2-40B4-BE49-F238E27FC236}">
+                <a16:creationId xmlns:a16="http://schemas.microsoft.com/office/drawing/2014/main" id="{27F420B2-E370-4A78-9652-A84D244B21C0}"/>
+              </a:ext>
+            </a:extLst>
+          </p:cNvPr>
+          <p:cNvSpPr>
+            <a:spLocks noGrp="1"/>
+          </p:cNvSpPr>
+          <p:nvPr>
+            <p:ph type="ftr" sz="quarter" idx="11"/>
+          </p:nvPr>
+        </p:nvSpPr>
+        <p:spPr/>
+        <p:txBody>
+          <a:bodyPr/>
+          <a:lstStyle/>
+          <a:p>
+            <a:r>
+              <a:rPr lang="en-US"/>
+              <a:t>Nodejs Basics</a:t>
+            </a:r>
+            <a:endParaRPr lang="en-US" dirty="0"/>
+          </a:p>
+        </p:txBody>
+      </p:sp>
+      <p:sp>
+        <p:nvSpPr>
+          <p:cNvPr id="5" name="Slide Number Placeholder 4">
+            <a:extLst>
+              <a:ext uri="{FF2B5EF4-FFF2-40B4-BE49-F238E27FC236}">
+                <a16:creationId xmlns:a16="http://schemas.microsoft.com/office/drawing/2014/main" id="{A4DD4D8E-668A-4EEE-8230-0E22DBBE6128}"/>
+              </a:ext>
+            </a:extLst>
+          </p:cNvPr>
+          <p:cNvSpPr>
+            <a:spLocks noGrp="1"/>
+          </p:cNvSpPr>
+          <p:nvPr>
+            <p:ph type="sldNum" sz="quarter" idx="12"/>
+          </p:nvPr>
+        </p:nvSpPr>
+        <p:spPr/>
+        <p:txBody>
+          <a:bodyPr/>
+          <a:lstStyle/>
+          <a:p>
+            <a:fld id="{3A98EE3D-8CD1-4C3F-BD1C-C98C9596463C}" type="slidenum">
+              <a:rPr lang="en-US" smtClean="0"/>
+              <a:t>13</a:t>
+            </a:fld>
+            <a:endParaRPr lang="en-US" dirty="0"/>
+          </a:p>
+        </p:txBody>
+      </p:sp>
+    </p:spTree>
+    <p:extLst>
+      <p:ext uri="{BB962C8B-B14F-4D97-AF65-F5344CB8AC3E}">
+        <p14:creationId xmlns:p14="http://schemas.microsoft.com/office/powerpoint/2010/main" val="3786645986"/>
+      </p:ext>
+    </p:extLst>
+  </p:cSld>
+  <p:clrMapOvr>
+    <a:masterClrMapping/>
+  </p:clrMapOvr>
+</p:sld>
+</file>
+
+<file path=ppt/slides/slide14.xml><?xml version="1.0" encoding="utf-8"?>
+<p:sld xmlns:a="http://schemas.openxmlformats.org/drawingml/2006/main" xmlns:r="http://schemas.openxmlformats.org/officeDocument/2006/relationships" xmlns:p="http://schemas.openxmlformats.org/presentationml/2006/main">
+  <p:cSld>
+    <p:spTree>
+      <p:nvGrpSpPr>
+        <p:cNvPr id="1" name=""/>
+        <p:cNvGrpSpPr/>
+        <p:nvPr/>
+      </p:nvGrpSpPr>
+      <p:grpSpPr>
+        <a:xfrm>
+          <a:off x="0" y="0"/>
+          <a:ext cx="0" cy="0"/>
+          <a:chOff x="0" y="0"/>
+          <a:chExt cx="0" cy="0"/>
+        </a:xfrm>
+      </p:grpSpPr>
+      <p:sp>
+        <p:nvSpPr>
+          <p:cNvPr id="2" name="Title 1">
+            <a:extLst>
+              <a:ext uri="{FF2B5EF4-FFF2-40B4-BE49-F238E27FC236}">
+                <a16:creationId xmlns:a16="http://schemas.microsoft.com/office/drawing/2014/main" id="{3E5C19C0-2A8E-4F47-98D0-96681B52317B}"/>
+              </a:ext>
+            </a:extLst>
+          </p:cNvPr>
+          <p:cNvSpPr>
+            <a:spLocks noGrp="1"/>
+          </p:cNvSpPr>
+          <p:nvPr>
+            <p:ph type="title"/>
+          </p:nvPr>
+        </p:nvSpPr>
+        <p:spPr/>
+        <p:txBody>
+          <a:bodyPr/>
+          <a:lstStyle/>
+          <a:p>
+            <a:r>
+              <a:rPr lang="en-US" dirty="0"/>
+              <a:t>Demo</a:t>
+            </a:r>
+          </a:p>
+        </p:txBody>
+      </p:sp>
+      <p:sp>
+        <p:nvSpPr>
+          <p:cNvPr id="3" name="Content Placeholder 2">
+            <a:extLst>
+              <a:ext uri="{FF2B5EF4-FFF2-40B4-BE49-F238E27FC236}">
+                <a16:creationId xmlns:a16="http://schemas.microsoft.com/office/drawing/2014/main" id="{392F03B5-CA0C-466F-951A-F9B652E19B40}"/>
+              </a:ext>
+            </a:extLst>
+          </p:cNvPr>
+          <p:cNvSpPr>
+            <a:spLocks noGrp="1"/>
+          </p:cNvSpPr>
+          <p:nvPr>
+            <p:ph idx="1"/>
+          </p:nvPr>
+        </p:nvSpPr>
+        <p:spPr/>
+        <p:txBody>
+          <a:bodyPr/>
+          <a:lstStyle/>
+          <a:p>
+            <a:r>
+              <a:rPr lang="en-US" dirty="0"/>
+              <a:t>Tags</a:t>
+            </a:r>
+          </a:p>
+          <a:p>
+            <a:pPr lvl="1"/>
+            <a:r>
+              <a:rPr lang="en-US" dirty="0"/>
+              <a:t>Group our resources</a:t>
+            </a:r>
+          </a:p>
+          <a:p>
+            <a:pPr lvl="1"/>
+            <a:r>
+              <a:rPr lang="en-US" dirty="0">
+                <a:latin typeface="Consolas" panose="020B0609020204030204" pitchFamily="49" charset="0"/>
+              </a:rPr>
+              <a:t>@ApiTags(‘your-tag’)</a:t>
+            </a:r>
+          </a:p>
+          <a:p>
+            <a:pPr lvl="1"/>
+            <a:r>
+              <a:rPr lang="en-US" dirty="0"/>
+              <a:t>Controller level and method level </a:t>
+            </a:r>
+            <a:r>
+              <a:rPr lang="en-US" dirty="0">
+                <a:sym typeface="Wingdings" panose="05000000000000000000" pitchFamily="2" charset="2"/>
+              </a:rPr>
+              <a:t></a:t>
+            </a:r>
+            <a:endParaRPr lang="en-US" dirty="0"/>
+          </a:p>
+        </p:txBody>
+      </p:sp>
+      <p:sp>
+        <p:nvSpPr>
+          <p:cNvPr id="4" name="Footer Placeholder 3">
+            <a:extLst>
+              <a:ext uri="{FF2B5EF4-FFF2-40B4-BE49-F238E27FC236}">
+                <a16:creationId xmlns:a16="http://schemas.microsoft.com/office/drawing/2014/main" id="{FA6A65C5-DC95-4501-A2EB-38D34743A3E0}"/>
+              </a:ext>
+            </a:extLst>
+          </p:cNvPr>
+          <p:cNvSpPr>
+            <a:spLocks noGrp="1"/>
+          </p:cNvSpPr>
+          <p:nvPr>
+            <p:ph type="ftr" sz="quarter" idx="11"/>
+          </p:nvPr>
+        </p:nvSpPr>
+        <p:spPr/>
+        <p:txBody>
+          <a:bodyPr/>
+          <a:lstStyle/>
+          <a:p>
+            <a:r>
+              <a:rPr lang="en-US"/>
+              <a:t>Nodejs Basics</a:t>
+            </a:r>
+            <a:endParaRPr lang="en-US" dirty="0"/>
+          </a:p>
+        </p:txBody>
+      </p:sp>
+      <p:sp>
+        <p:nvSpPr>
+          <p:cNvPr id="5" name="Slide Number Placeholder 4">
+            <a:extLst>
+              <a:ext uri="{FF2B5EF4-FFF2-40B4-BE49-F238E27FC236}">
+                <a16:creationId xmlns:a16="http://schemas.microsoft.com/office/drawing/2014/main" id="{C7715581-9D56-4144-87EC-6A94E6C90CE1}"/>
+              </a:ext>
+            </a:extLst>
+          </p:cNvPr>
+          <p:cNvSpPr>
+            <a:spLocks noGrp="1"/>
+          </p:cNvSpPr>
+          <p:nvPr>
+            <p:ph type="sldNum" sz="quarter" idx="12"/>
+          </p:nvPr>
+        </p:nvSpPr>
+        <p:spPr/>
+        <p:txBody>
+          <a:bodyPr/>
+          <a:lstStyle/>
+          <a:p>
+            <a:fld id="{3A98EE3D-8CD1-4C3F-BD1C-C98C9596463C}" type="slidenum">
+              <a:rPr lang="en-US" smtClean="0"/>
+              <a:t>14</a:t>
+            </a:fld>
+            <a:endParaRPr lang="en-US" dirty="0"/>
+          </a:p>
+        </p:txBody>
+      </p:sp>
+    </p:spTree>
+    <p:extLst>
+      <p:ext uri="{BB962C8B-B14F-4D97-AF65-F5344CB8AC3E}">
+        <p14:creationId xmlns:p14="http://schemas.microsoft.com/office/powerpoint/2010/main" val="752204133"/>
+      </p:ext>
+    </p:extLst>
+  </p:cSld>
+  <p:clrMapOvr>
+    <a:masterClrMapping/>
+  </p:clrMapOvr>
+</p:sld>
+</file>
+
+<file path=ppt/slides/slide15.xml><?xml version="1.0" encoding="utf-8"?>
+<p:sld xmlns:a="http://schemas.openxmlformats.org/drawingml/2006/main" xmlns:r="http://schemas.openxmlformats.org/officeDocument/2006/relationships" xmlns:p="http://schemas.openxmlformats.org/presentationml/2006/main">
+  <p:cSld>
+    <p:spTree>
+      <p:nvGrpSpPr>
+        <p:cNvPr id="1" name=""/>
+        <p:cNvGrpSpPr/>
+        <p:nvPr/>
+      </p:nvGrpSpPr>
+      <p:grpSpPr>
+        <a:xfrm>
+          <a:off x="0" y="0"/>
+          <a:ext cx="0" cy="0"/>
+          <a:chOff x="0" y="0"/>
+          <a:chExt cx="0" cy="0"/>
+        </a:xfrm>
+      </p:grpSpPr>
+      <p:sp>
+        <p:nvSpPr>
+          <p:cNvPr id="2" name="Title 1">
+            <a:extLst>
+              <a:ext uri="{FF2B5EF4-FFF2-40B4-BE49-F238E27FC236}">
+                <a16:creationId xmlns:a16="http://schemas.microsoft.com/office/drawing/2014/main" id="{6B1A0672-14A7-4501-900C-A98EBCCF7AFE}"/>
+              </a:ext>
+            </a:extLst>
+          </p:cNvPr>
+          <p:cNvSpPr>
+            <a:spLocks noGrp="1"/>
+          </p:cNvSpPr>
+          <p:nvPr>
+            <p:ph type="title"/>
+          </p:nvPr>
+        </p:nvSpPr>
+        <p:spPr/>
+        <p:txBody>
+          <a:bodyPr/>
+          <a:lstStyle/>
+          <a:p>
+            <a:r>
+              <a:rPr lang="en-US" dirty="0"/>
+              <a:t>Exercise</a:t>
+            </a:r>
+          </a:p>
+        </p:txBody>
+      </p:sp>
+      <p:sp>
+        <p:nvSpPr>
+          <p:cNvPr id="3" name="Content Placeholder 2">
+            <a:extLst>
+              <a:ext uri="{FF2B5EF4-FFF2-40B4-BE49-F238E27FC236}">
+                <a16:creationId xmlns:a16="http://schemas.microsoft.com/office/drawing/2014/main" id="{2AEB1BE9-8435-42BF-A4F1-2F148FA9187A}"/>
+              </a:ext>
+            </a:extLst>
+          </p:cNvPr>
+          <p:cNvSpPr>
+            <a:spLocks noGrp="1"/>
+          </p:cNvSpPr>
+          <p:nvPr>
+            <p:ph idx="1"/>
+          </p:nvPr>
+        </p:nvSpPr>
+        <p:spPr/>
+        <p:txBody>
+          <a:bodyPr>
+            <a:normAutofit/>
+          </a:bodyPr>
+          <a:lstStyle/>
+          <a:p>
+            <a:r>
+              <a:rPr lang="en-US" dirty="0"/>
+              <a:t>Required:</a:t>
+            </a:r>
+          </a:p>
+          <a:p>
+            <a:pPr lvl="1"/>
+            <a:r>
+              <a:rPr lang="en-US" dirty="0"/>
+              <a:t>Exercise all we speak</a:t>
+            </a:r>
+          </a:p>
+          <a:p>
+            <a:pPr lvl="1"/>
+            <a:r>
+              <a:rPr lang="en-US" dirty="0"/>
+              <a:t>Create your swagger </a:t>
+            </a:r>
+            <a:r>
+              <a:rPr lang="en-US" dirty="0" err="1"/>
+              <a:t>ui</a:t>
+            </a:r>
+            <a:endParaRPr lang="fa-IR" dirty="0"/>
+          </a:p>
+        </p:txBody>
+      </p:sp>
+      <p:sp>
+        <p:nvSpPr>
+          <p:cNvPr id="4" name="Footer Placeholder 3">
+            <a:extLst>
+              <a:ext uri="{FF2B5EF4-FFF2-40B4-BE49-F238E27FC236}">
+                <a16:creationId xmlns:a16="http://schemas.microsoft.com/office/drawing/2014/main" id="{E3C0E9F9-B143-43AD-BD5C-508C3E46FF7B}"/>
+              </a:ext>
+            </a:extLst>
+          </p:cNvPr>
+          <p:cNvSpPr>
+            <a:spLocks noGrp="1"/>
+          </p:cNvSpPr>
+          <p:nvPr>
+            <p:ph type="ftr" sz="quarter" idx="11"/>
+          </p:nvPr>
+        </p:nvSpPr>
+        <p:spPr/>
+        <p:txBody>
+          <a:bodyPr/>
+          <a:lstStyle/>
+          <a:p>
+            <a:r>
+              <a:rPr lang="en-US"/>
+              <a:t>Nodejs Basics</a:t>
+            </a:r>
+            <a:endParaRPr lang="en-US" dirty="0"/>
+          </a:p>
+        </p:txBody>
+      </p:sp>
+      <p:sp>
+        <p:nvSpPr>
+          <p:cNvPr id="5" name="Slide Number Placeholder 4">
+            <a:extLst>
+              <a:ext uri="{FF2B5EF4-FFF2-40B4-BE49-F238E27FC236}">
+                <a16:creationId xmlns:a16="http://schemas.microsoft.com/office/drawing/2014/main" id="{1B95C015-BA9F-40C7-A04C-3B835E7354AB}"/>
+              </a:ext>
+            </a:extLst>
+          </p:cNvPr>
+          <p:cNvSpPr>
+            <a:spLocks noGrp="1"/>
+          </p:cNvSpPr>
+          <p:nvPr>
+            <p:ph type="sldNum" sz="quarter" idx="12"/>
+          </p:nvPr>
+        </p:nvSpPr>
+        <p:spPr/>
+        <p:txBody>
+          <a:bodyPr/>
+          <a:lstStyle/>
+          <a:p>
+            <a:fld id="{3A98EE3D-8CD1-4C3F-BD1C-C98C9596463C}" type="slidenum">
+              <a:rPr lang="en-US" smtClean="0"/>
+              <a:t>15</a:t>
+            </a:fld>
+            <a:endParaRPr lang="en-US" dirty="0"/>
+          </a:p>
+        </p:txBody>
+      </p:sp>
+    </p:spTree>
+    <p:extLst>
+      <p:ext uri="{BB962C8B-B14F-4D97-AF65-F5344CB8AC3E}">
+        <p14:creationId xmlns:p14="http://schemas.microsoft.com/office/powerpoint/2010/main" val="817859998"/>
+      </p:ext>
+    </p:extLst>
+  </p:cSld>
+  <p:clrMapOvr>
+    <a:masterClrMapping/>
+  </p:clrMapOvr>
+</p:sld>
+</file>
+
 <file path=ppt/slides/slide2.xml><?xml version="1.0" encoding="utf-8"?>
 <p:sld xmlns:a="http://schemas.openxmlformats.org/drawingml/2006/main" xmlns:r="http://schemas.openxmlformats.org/officeDocument/2006/relationships" xmlns:p="http://schemas.openxmlformats.org/presentationml/2006/main">
   <p:cSld>
@@ -7156,627 +8919,6 @@
           <p:cNvPr id="2" name="Title 1">
             <a:extLst>
               <a:ext uri="{FF2B5EF4-FFF2-40B4-BE49-F238E27FC236}">
-                <a16:creationId xmlns:a16="http://schemas.microsoft.com/office/drawing/2014/main" id="{80F762D4-A843-463B-82DD-D9EDE7DB59FF}"/>
-              </a:ext>
-            </a:extLst>
-          </p:cNvPr>
-          <p:cNvSpPr>
-            <a:spLocks noGrp="1"/>
-          </p:cNvSpPr>
-          <p:nvPr>
-            <p:ph type="title"/>
-          </p:nvPr>
-        </p:nvSpPr>
-        <p:spPr/>
-        <p:txBody>
-          <a:bodyPr/>
-          <a:lstStyle/>
-          <a:p>
-            <a:r>
-              <a:rPr lang="en-US" dirty="0"/>
-              <a:t>New requirement</a:t>
-            </a:r>
-          </a:p>
-        </p:txBody>
-      </p:sp>
-      <p:sp>
-        <p:nvSpPr>
-          <p:cNvPr id="3" name="Content Placeholder 2">
-            <a:extLst>
-              <a:ext uri="{FF2B5EF4-FFF2-40B4-BE49-F238E27FC236}">
-                <a16:creationId xmlns:a16="http://schemas.microsoft.com/office/drawing/2014/main" id="{BFF78A40-5448-4212-BD70-5E8C0095277D}"/>
-              </a:ext>
-            </a:extLst>
-          </p:cNvPr>
-          <p:cNvSpPr>
-            <a:spLocks noGrp="1"/>
-          </p:cNvSpPr>
-          <p:nvPr>
-            <p:ph idx="1"/>
-          </p:nvPr>
-        </p:nvSpPr>
-        <p:spPr/>
-        <p:txBody>
-          <a:bodyPr/>
-          <a:lstStyle/>
-          <a:p>
-            <a:r>
-              <a:rPr lang="en-US" dirty="0"/>
-              <a:t>Dev:</a:t>
-            </a:r>
-          </a:p>
-          <a:p>
-            <a:pPr lvl="1"/>
-            <a:r>
-              <a:rPr lang="en-US" dirty="0"/>
-              <a:t>Log every request duration, we want this to measure our performance </a:t>
-            </a:r>
-            <a:r>
-              <a:rPr lang="en-US" dirty="0">
-                <a:sym typeface="Wingdings" panose="05000000000000000000" pitchFamily="2" charset="2"/>
-              </a:rPr>
-              <a:t></a:t>
-            </a:r>
-            <a:endParaRPr lang="en-US" dirty="0"/>
-          </a:p>
-          <a:p>
-            <a:pPr lvl="1"/>
-            <a:endParaRPr lang="en-US" dirty="0"/>
-          </a:p>
-        </p:txBody>
-      </p:sp>
-      <p:sp>
-        <p:nvSpPr>
-          <p:cNvPr id="4" name="Footer Placeholder 3">
-            <a:extLst>
-              <a:ext uri="{FF2B5EF4-FFF2-40B4-BE49-F238E27FC236}">
-                <a16:creationId xmlns:a16="http://schemas.microsoft.com/office/drawing/2014/main" id="{098447D3-F92B-4607-A138-6F9DA6B4A32F}"/>
-              </a:ext>
-            </a:extLst>
-          </p:cNvPr>
-          <p:cNvSpPr>
-            <a:spLocks noGrp="1"/>
-          </p:cNvSpPr>
-          <p:nvPr>
-            <p:ph type="ftr" sz="quarter" idx="11"/>
-          </p:nvPr>
-        </p:nvSpPr>
-        <p:spPr/>
-        <p:txBody>
-          <a:bodyPr/>
-          <a:lstStyle/>
-          <a:p>
-            <a:r>
-              <a:rPr lang="en-US"/>
-              <a:t>Nodejs Basics</a:t>
-            </a:r>
-            <a:endParaRPr lang="en-US" dirty="0"/>
-          </a:p>
-        </p:txBody>
-      </p:sp>
-      <p:sp>
-        <p:nvSpPr>
-          <p:cNvPr id="5" name="Slide Number Placeholder 4">
-            <a:extLst>
-              <a:ext uri="{FF2B5EF4-FFF2-40B4-BE49-F238E27FC236}">
-                <a16:creationId xmlns:a16="http://schemas.microsoft.com/office/drawing/2014/main" id="{6C8FCFB8-044D-4395-9869-7485523DF77B}"/>
-              </a:ext>
-            </a:extLst>
-          </p:cNvPr>
-          <p:cNvSpPr>
-            <a:spLocks noGrp="1"/>
-          </p:cNvSpPr>
-          <p:nvPr>
-            <p:ph type="sldNum" sz="quarter" idx="12"/>
-          </p:nvPr>
-        </p:nvSpPr>
-        <p:spPr/>
-        <p:txBody>
-          <a:bodyPr/>
-          <a:lstStyle/>
-          <a:p>
-            <a:fld id="{3A98EE3D-8CD1-4C3F-BD1C-C98C9596463C}" type="slidenum">
-              <a:rPr lang="en-US" smtClean="0"/>
-              <a:t>3</a:t>
-            </a:fld>
-            <a:endParaRPr lang="en-US" dirty="0"/>
-          </a:p>
-        </p:txBody>
-      </p:sp>
-    </p:spTree>
-    <p:extLst>
-      <p:ext uri="{BB962C8B-B14F-4D97-AF65-F5344CB8AC3E}">
-        <p14:creationId xmlns:p14="http://schemas.microsoft.com/office/powerpoint/2010/main" val="2545455785"/>
-      </p:ext>
-    </p:extLst>
-  </p:cSld>
-  <p:clrMapOvr>
-    <a:masterClrMapping/>
-  </p:clrMapOvr>
-</p:sld>
-</file>
-
-<file path=ppt/slides/slide4.xml><?xml version="1.0" encoding="utf-8"?>
-<p:sld xmlns:a="http://schemas.openxmlformats.org/drawingml/2006/main" xmlns:r="http://schemas.openxmlformats.org/officeDocument/2006/relationships" xmlns:p="http://schemas.openxmlformats.org/presentationml/2006/main">
-  <p:cSld>
-    <p:spTree>
-      <p:nvGrpSpPr>
-        <p:cNvPr id="1" name=""/>
-        <p:cNvGrpSpPr/>
-        <p:nvPr/>
-      </p:nvGrpSpPr>
-      <p:grpSpPr>
-        <a:xfrm>
-          <a:off x="0" y="0"/>
-          <a:ext cx="0" cy="0"/>
-          <a:chOff x="0" y="0"/>
-          <a:chExt cx="0" cy="0"/>
-        </a:xfrm>
-      </p:grpSpPr>
-      <p:sp>
-        <p:nvSpPr>
-          <p:cNvPr id="2" name="Title 1">
-            <a:extLst>
-              <a:ext uri="{FF2B5EF4-FFF2-40B4-BE49-F238E27FC236}">
-                <a16:creationId xmlns:a16="http://schemas.microsoft.com/office/drawing/2014/main" id="{7C98B97C-3663-43CD-874E-2BB4CE1C8897}"/>
-              </a:ext>
-            </a:extLst>
-          </p:cNvPr>
-          <p:cNvSpPr>
-            <a:spLocks noGrp="1"/>
-          </p:cNvSpPr>
-          <p:nvPr>
-            <p:ph type="title"/>
-          </p:nvPr>
-        </p:nvSpPr>
-        <p:spPr/>
-        <p:txBody>
-          <a:bodyPr/>
-          <a:lstStyle/>
-          <a:p>
-            <a:r>
-              <a:rPr lang="en-US" dirty="0"/>
-              <a:t>Demo</a:t>
-            </a:r>
-          </a:p>
-        </p:txBody>
-      </p:sp>
-      <p:sp>
-        <p:nvSpPr>
-          <p:cNvPr id="3" name="Content Placeholder 2">
-            <a:extLst>
-              <a:ext uri="{FF2B5EF4-FFF2-40B4-BE49-F238E27FC236}">
-                <a16:creationId xmlns:a16="http://schemas.microsoft.com/office/drawing/2014/main" id="{3B721B17-E87C-4130-9BC5-89CE3661FC1D}"/>
-              </a:ext>
-            </a:extLst>
-          </p:cNvPr>
-          <p:cNvSpPr>
-            <a:spLocks noGrp="1"/>
-          </p:cNvSpPr>
-          <p:nvPr>
-            <p:ph idx="1"/>
-          </p:nvPr>
-        </p:nvSpPr>
-        <p:spPr/>
-        <p:txBody>
-          <a:bodyPr/>
-          <a:lstStyle/>
-          <a:p>
-            <a:r>
-              <a:rPr lang="en-US" dirty="0"/>
-              <a:t>Middleware:</a:t>
-            </a:r>
-          </a:p>
-          <a:p>
-            <a:pPr lvl="1"/>
-            <a:r>
-              <a:rPr lang="en-US" dirty="0"/>
-              <a:t>They have access to req and res objects</a:t>
-            </a:r>
-          </a:p>
-          <a:p>
-            <a:pPr lvl="1"/>
-            <a:r>
-              <a:rPr lang="en-US" dirty="0"/>
-              <a:t>Benefits:</a:t>
-            </a:r>
-          </a:p>
-          <a:p>
-            <a:pPr lvl="2"/>
-            <a:r>
-              <a:rPr lang="en-US" dirty="0"/>
-              <a:t>Making changes to req, res</a:t>
-            </a:r>
-          </a:p>
-          <a:p>
-            <a:pPr lvl="2"/>
-            <a:r>
-              <a:rPr lang="en-US" dirty="0"/>
-              <a:t>Ending req, res cycle</a:t>
-            </a:r>
-          </a:p>
-          <a:p>
-            <a:pPr lvl="2"/>
-            <a:r>
-              <a:rPr lang="en-US" dirty="0"/>
-              <a:t>You have to call next method</a:t>
-            </a:r>
-          </a:p>
-          <a:p>
-            <a:pPr lvl="1"/>
-            <a:r>
-              <a:rPr lang="en-US" dirty="0"/>
-              <a:t>How to create them:</a:t>
-            </a:r>
-          </a:p>
-          <a:p>
-            <a:pPr lvl="2"/>
-            <a:r>
-              <a:rPr lang="en-US" dirty="0">
-                <a:latin typeface="Consolas" panose="020B0609020204030204" pitchFamily="49" charset="0"/>
-              </a:rPr>
-              <a:t>nest g middleware &lt;path-to-your-class&gt;</a:t>
-            </a:r>
-          </a:p>
-          <a:p>
-            <a:pPr lvl="1"/>
-            <a:r>
-              <a:rPr lang="en-US" dirty="0"/>
-              <a:t>Function Middlewares are stateless, buy class Middlewares is able to have state</a:t>
-            </a:r>
-          </a:p>
-        </p:txBody>
-      </p:sp>
-      <p:sp>
-        <p:nvSpPr>
-          <p:cNvPr id="4" name="Footer Placeholder 3">
-            <a:extLst>
-              <a:ext uri="{FF2B5EF4-FFF2-40B4-BE49-F238E27FC236}">
-                <a16:creationId xmlns:a16="http://schemas.microsoft.com/office/drawing/2014/main" id="{F1D396F6-5965-4C34-969D-4E0AAC94EBE2}"/>
-              </a:ext>
-            </a:extLst>
-          </p:cNvPr>
-          <p:cNvSpPr>
-            <a:spLocks noGrp="1"/>
-          </p:cNvSpPr>
-          <p:nvPr>
-            <p:ph type="ftr" sz="quarter" idx="11"/>
-          </p:nvPr>
-        </p:nvSpPr>
-        <p:spPr/>
-        <p:txBody>
-          <a:bodyPr/>
-          <a:lstStyle/>
-          <a:p>
-            <a:r>
-              <a:rPr lang="en-US"/>
-              <a:t>Nodejs Basics</a:t>
-            </a:r>
-            <a:endParaRPr lang="en-US" dirty="0"/>
-          </a:p>
-        </p:txBody>
-      </p:sp>
-      <p:sp>
-        <p:nvSpPr>
-          <p:cNvPr id="5" name="Slide Number Placeholder 4">
-            <a:extLst>
-              <a:ext uri="{FF2B5EF4-FFF2-40B4-BE49-F238E27FC236}">
-                <a16:creationId xmlns:a16="http://schemas.microsoft.com/office/drawing/2014/main" id="{DADCC05A-E211-4F4B-9AA9-1CB11FE83FB4}"/>
-              </a:ext>
-            </a:extLst>
-          </p:cNvPr>
-          <p:cNvSpPr>
-            <a:spLocks noGrp="1"/>
-          </p:cNvSpPr>
-          <p:nvPr>
-            <p:ph type="sldNum" sz="quarter" idx="12"/>
-          </p:nvPr>
-        </p:nvSpPr>
-        <p:spPr/>
-        <p:txBody>
-          <a:bodyPr/>
-          <a:lstStyle/>
-          <a:p>
-            <a:fld id="{3A98EE3D-8CD1-4C3F-BD1C-C98C9596463C}" type="slidenum">
-              <a:rPr lang="en-US" smtClean="0"/>
-              <a:t>4</a:t>
-            </a:fld>
-            <a:endParaRPr lang="en-US" dirty="0"/>
-          </a:p>
-        </p:txBody>
-      </p:sp>
-    </p:spTree>
-    <p:extLst>
-      <p:ext uri="{BB962C8B-B14F-4D97-AF65-F5344CB8AC3E}">
-        <p14:creationId xmlns:p14="http://schemas.microsoft.com/office/powerpoint/2010/main" val="3193930332"/>
-      </p:ext>
-    </p:extLst>
-  </p:cSld>
-  <p:clrMapOvr>
-    <a:masterClrMapping/>
-  </p:clrMapOvr>
-</p:sld>
-</file>
-
-<file path=ppt/slides/slide5.xml><?xml version="1.0" encoding="utf-8"?>
-<p:sld xmlns:a="http://schemas.openxmlformats.org/drawingml/2006/main" xmlns:r="http://schemas.openxmlformats.org/officeDocument/2006/relationships" xmlns:p="http://schemas.openxmlformats.org/presentationml/2006/main">
-  <p:cSld>
-    <p:spTree>
-      <p:nvGrpSpPr>
-        <p:cNvPr id="1" name=""/>
-        <p:cNvGrpSpPr/>
-        <p:nvPr/>
-      </p:nvGrpSpPr>
-      <p:grpSpPr>
-        <a:xfrm>
-          <a:off x="0" y="0"/>
-          <a:ext cx="0" cy="0"/>
-          <a:chOff x="0" y="0"/>
-          <a:chExt cx="0" cy="0"/>
-        </a:xfrm>
-      </p:grpSpPr>
-      <p:sp>
-        <p:nvSpPr>
-          <p:cNvPr id="2" name="Title 1">
-            <a:extLst>
-              <a:ext uri="{FF2B5EF4-FFF2-40B4-BE49-F238E27FC236}">
-                <a16:creationId xmlns:a16="http://schemas.microsoft.com/office/drawing/2014/main" id="{60070020-B583-4B9E-9C23-16AB23FD7BDB}"/>
-              </a:ext>
-            </a:extLst>
-          </p:cNvPr>
-          <p:cNvSpPr>
-            <a:spLocks noGrp="1"/>
-          </p:cNvSpPr>
-          <p:nvPr>
-            <p:ph type="title"/>
-          </p:nvPr>
-        </p:nvSpPr>
-        <p:spPr/>
-        <p:txBody>
-          <a:bodyPr/>
-          <a:lstStyle/>
-          <a:p>
-            <a:r>
-              <a:rPr lang="en-US" dirty="0"/>
-              <a:t>Demo</a:t>
-            </a:r>
-          </a:p>
-        </p:txBody>
-      </p:sp>
-      <p:sp>
-        <p:nvSpPr>
-          <p:cNvPr id="3" name="Content Placeholder 2">
-            <a:extLst>
-              <a:ext uri="{FF2B5EF4-FFF2-40B4-BE49-F238E27FC236}">
-                <a16:creationId xmlns:a16="http://schemas.microsoft.com/office/drawing/2014/main" id="{76F2F745-7621-4900-82C9-22402813DCB5}"/>
-              </a:ext>
-            </a:extLst>
-          </p:cNvPr>
-          <p:cNvSpPr>
-            <a:spLocks noGrp="1"/>
-          </p:cNvSpPr>
-          <p:nvPr>
-            <p:ph idx="1"/>
-          </p:nvPr>
-        </p:nvSpPr>
-        <p:spPr/>
-        <p:txBody>
-          <a:bodyPr/>
-          <a:lstStyle/>
-          <a:p>
-            <a:r>
-              <a:rPr lang="en-US" dirty="0"/>
-              <a:t>How to use them?</a:t>
-            </a:r>
-          </a:p>
-          <a:p>
-            <a:pPr lvl="1"/>
-            <a:r>
-              <a:rPr lang="en-US" dirty="0"/>
-              <a:t>Middlewares are not bind to any methods, but instead to routes so</a:t>
-            </a:r>
-          </a:p>
-          <a:p>
-            <a:pPr lvl="2"/>
-            <a:r>
-              <a:rPr lang="en-US" dirty="0"/>
-              <a:t>You can’t inject them, you have to change your module structure as follows</a:t>
-            </a:r>
-          </a:p>
-          <a:p>
-            <a:pPr lvl="1"/>
-            <a:r>
-              <a:rPr lang="en-US" dirty="0"/>
-              <a:t>Implements </a:t>
-            </a:r>
-            <a:r>
-              <a:rPr lang="en-US" dirty="0" err="1"/>
-              <a:t>NestModule</a:t>
-            </a:r>
-            <a:r>
-              <a:rPr lang="en-US" dirty="0"/>
-              <a:t> interface</a:t>
-            </a:r>
-          </a:p>
-          <a:p>
-            <a:pPr lvl="2"/>
-            <a:r>
-              <a:rPr lang="en-US" dirty="0"/>
-              <a:t>Require you to define </a:t>
-            </a:r>
-            <a:r>
-              <a:rPr lang="en-US" dirty="0">
-                <a:latin typeface="Consolas" panose="020B0609020204030204" pitchFamily="49" charset="0"/>
-              </a:rPr>
-              <a:t>configure() </a:t>
-            </a:r>
-            <a:r>
-              <a:rPr lang="en-US" dirty="0"/>
-              <a:t>function with a consumer</a:t>
-            </a:r>
-          </a:p>
-          <a:p>
-            <a:pPr lvl="2"/>
-            <a:r>
-              <a:rPr lang="en-US" dirty="0" err="1">
-                <a:latin typeface="Consolas" panose="020B0609020204030204" pitchFamily="49" charset="0"/>
-              </a:rPr>
-              <a:t>consumer.apply</a:t>
-            </a:r>
-            <a:r>
-              <a:rPr lang="en-US" dirty="0">
-                <a:latin typeface="Consolas" panose="020B0609020204030204" pitchFamily="49" charset="0"/>
-              </a:rPr>
-              <a:t>(your-middleware).</a:t>
-            </a:r>
-            <a:r>
-              <a:rPr lang="en-US" dirty="0" err="1">
-                <a:latin typeface="Consolas" panose="020B0609020204030204" pitchFamily="49" charset="0"/>
-              </a:rPr>
-              <a:t>forRoutes</a:t>
-            </a:r>
-            <a:r>
-              <a:rPr lang="en-US" dirty="0">
-                <a:latin typeface="Consolas" panose="020B0609020204030204" pitchFamily="49" charset="0"/>
-              </a:rPr>
-              <a:t>(‘*’)</a:t>
-            </a:r>
-          </a:p>
-          <a:p>
-            <a:pPr lvl="2"/>
-            <a:r>
-              <a:rPr lang="en-US" dirty="0"/>
-              <a:t>You can </a:t>
-            </a:r>
-            <a:r>
-              <a:rPr lang="en-US" dirty="0">
-                <a:latin typeface="Consolas" panose="020B0609020204030204" pitchFamily="49" charset="0"/>
-              </a:rPr>
-              <a:t>exclude() </a:t>
-            </a:r>
-            <a:r>
-              <a:rPr lang="en-US" dirty="0"/>
-              <a:t>some routes</a:t>
-            </a:r>
-          </a:p>
-          <a:p>
-            <a:r>
-              <a:rPr lang="en-US" dirty="0"/>
-              <a:t>Res object has some useful events</a:t>
-            </a:r>
-          </a:p>
-          <a:p>
-            <a:pPr lvl="1"/>
-            <a:r>
-              <a:rPr lang="en-US" dirty="0"/>
-              <a:t>Add our callback to </a:t>
-            </a:r>
-            <a:r>
-              <a:rPr lang="en-US" sz="1800" dirty="0">
-                <a:latin typeface="Consolas" panose="020B0609020204030204" pitchFamily="49" charset="0"/>
-              </a:rPr>
-              <a:t>finish</a:t>
-            </a:r>
-            <a:r>
-              <a:rPr lang="en-US" dirty="0"/>
-              <a:t> event on res</a:t>
-            </a:r>
-          </a:p>
-        </p:txBody>
-      </p:sp>
-      <p:sp>
-        <p:nvSpPr>
-          <p:cNvPr id="4" name="Footer Placeholder 3">
-            <a:extLst>
-              <a:ext uri="{FF2B5EF4-FFF2-40B4-BE49-F238E27FC236}">
-                <a16:creationId xmlns:a16="http://schemas.microsoft.com/office/drawing/2014/main" id="{98E37E77-EC0E-4CD0-8FC5-ADCDD08502F6}"/>
-              </a:ext>
-            </a:extLst>
-          </p:cNvPr>
-          <p:cNvSpPr>
-            <a:spLocks noGrp="1"/>
-          </p:cNvSpPr>
-          <p:nvPr>
-            <p:ph type="ftr" sz="quarter" idx="11"/>
-          </p:nvPr>
-        </p:nvSpPr>
-        <p:spPr/>
-        <p:txBody>
-          <a:bodyPr/>
-          <a:lstStyle/>
-          <a:p>
-            <a:r>
-              <a:rPr lang="en-US"/>
-              <a:t>Nodejs Basics</a:t>
-            </a:r>
-            <a:endParaRPr lang="en-US" dirty="0"/>
-          </a:p>
-        </p:txBody>
-      </p:sp>
-      <p:sp>
-        <p:nvSpPr>
-          <p:cNvPr id="5" name="Slide Number Placeholder 4">
-            <a:extLst>
-              <a:ext uri="{FF2B5EF4-FFF2-40B4-BE49-F238E27FC236}">
-                <a16:creationId xmlns:a16="http://schemas.microsoft.com/office/drawing/2014/main" id="{A1C9AFEB-A955-463C-940F-72A39F2D653F}"/>
-              </a:ext>
-            </a:extLst>
-          </p:cNvPr>
-          <p:cNvSpPr>
-            <a:spLocks noGrp="1"/>
-          </p:cNvSpPr>
-          <p:nvPr>
-            <p:ph type="sldNum" sz="quarter" idx="12"/>
-          </p:nvPr>
-        </p:nvSpPr>
-        <p:spPr/>
-        <p:txBody>
-          <a:bodyPr/>
-          <a:lstStyle/>
-          <a:p>
-            <a:fld id="{3A98EE3D-8CD1-4C3F-BD1C-C98C9596463C}" type="slidenum">
-              <a:rPr lang="en-US" smtClean="0"/>
-              <a:t>5</a:t>
-            </a:fld>
-            <a:endParaRPr lang="en-US" dirty="0"/>
-          </a:p>
-        </p:txBody>
-      </p:sp>
-    </p:spTree>
-    <p:extLst>
-      <p:ext uri="{BB962C8B-B14F-4D97-AF65-F5344CB8AC3E}">
-        <p14:creationId xmlns:p14="http://schemas.microsoft.com/office/powerpoint/2010/main" val="3784153259"/>
-      </p:ext>
-    </p:extLst>
-  </p:cSld>
-  <p:clrMapOvr>
-    <a:masterClrMapping/>
-  </p:clrMapOvr>
-</p:sld>
-</file>
-
-<file path=ppt/slides/slide6.xml><?xml version="1.0" encoding="utf-8"?>
-<p:sld xmlns:a="http://schemas.openxmlformats.org/drawingml/2006/main" xmlns:r="http://schemas.openxmlformats.org/officeDocument/2006/relationships" xmlns:p="http://schemas.openxmlformats.org/presentationml/2006/main">
-  <p:cSld>
-    <p:spTree>
-      <p:nvGrpSpPr>
-        <p:cNvPr id="1" name=""/>
-        <p:cNvGrpSpPr/>
-        <p:nvPr/>
-      </p:nvGrpSpPr>
-      <p:grpSpPr>
-        <a:xfrm>
-          <a:off x="0" y="0"/>
-          <a:ext cx="0" cy="0"/>
-          <a:chOff x="0" y="0"/>
-          <a:chExt cx="0" cy="0"/>
-        </a:xfrm>
-      </p:grpSpPr>
-      <p:sp>
-        <p:nvSpPr>
-          <p:cNvPr id="2" name="Title 1">
-            <a:extLst>
-              <a:ext uri="{FF2B5EF4-FFF2-40B4-BE49-F238E27FC236}">
                 <a16:creationId xmlns:a16="http://schemas.microsoft.com/office/drawing/2014/main" id="{6ED9877A-E202-4619-8997-A577FDC71D18}"/>
               </a:ext>
             </a:extLst>
@@ -7852,7 +8994,7 @@
           <a:p>
             <a:fld id="{3A98EE3D-8CD1-4C3F-BD1C-C98C9596463C}" type="slidenum">
               <a:rPr lang="en-US" smtClean="0"/>
-              <a:t>6</a:t>
+              <a:t>3</a:t>
             </a:fld>
             <a:endParaRPr lang="en-US" dirty="0"/>
           </a:p>
@@ -7965,6 +9107,627 @@
 </p:sld>
 </file>
 
+<file path=ppt/slides/slide4.xml><?xml version="1.0" encoding="utf-8"?>
+<p:sld xmlns:a="http://schemas.openxmlformats.org/drawingml/2006/main" xmlns:r="http://schemas.openxmlformats.org/officeDocument/2006/relationships" xmlns:p="http://schemas.openxmlformats.org/presentationml/2006/main">
+  <p:cSld>
+    <p:spTree>
+      <p:nvGrpSpPr>
+        <p:cNvPr id="1" name=""/>
+        <p:cNvGrpSpPr/>
+        <p:nvPr/>
+      </p:nvGrpSpPr>
+      <p:grpSpPr>
+        <a:xfrm>
+          <a:off x="0" y="0"/>
+          <a:ext cx="0" cy="0"/>
+          <a:chOff x="0" y="0"/>
+          <a:chExt cx="0" cy="0"/>
+        </a:xfrm>
+      </p:grpSpPr>
+      <p:sp>
+        <p:nvSpPr>
+          <p:cNvPr id="2" name="Title 1">
+            <a:extLst>
+              <a:ext uri="{FF2B5EF4-FFF2-40B4-BE49-F238E27FC236}">
+                <a16:creationId xmlns:a16="http://schemas.microsoft.com/office/drawing/2014/main" id="{80F762D4-A843-463B-82DD-D9EDE7DB59FF}"/>
+              </a:ext>
+            </a:extLst>
+          </p:cNvPr>
+          <p:cNvSpPr>
+            <a:spLocks noGrp="1"/>
+          </p:cNvSpPr>
+          <p:nvPr>
+            <p:ph type="title"/>
+          </p:nvPr>
+        </p:nvSpPr>
+        <p:spPr/>
+        <p:txBody>
+          <a:bodyPr/>
+          <a:lstStyle/>
+          <a:p>
+            <a:r>
+              <a:rPr lang="en-US" dirty="0"/>
+              <a:t>New requirement</a:t>
+            </a:r>
+          </a:p>
+        </p:txBody>
+      </p:sp>
+      <p:sp>
+        <p:nvSpPr>
+          <p:cNvPr id="3" name="Content Placeholder 2">
+            <a:extLst>
+              <a:ext uri="{FF2B5EF4-FFF2-40B4-BE49-F238E27FC236}">
+                <a16:creationId xmlns:a16="http://schemas.microsoft.com/office/drawing/2014/main" id="{BFF78A40-5448-4212-BD70-5E8C0095277D}"/>
+              </a:ext>
+            </a:extLst>
+          </p:cNvPr>
+          <p:cNvSpPr>
+            <a:spLocks noGrp="1"/>
+          </p:cNvSpPr>
+          <p:nvPr>
+            <p:ph idx="1"/>
+          </p:nvPr>
+        </p:nvSpPr>
+        <p:spPr/>
+        <p:txBody>
+          <a:bodyPr/>
+          <a:lstStyle/>
+          <a:p>
+            <a:r>
+              <a:rPr lang="en-US" dirty="0"/>
+              <a:t>Dev:</a:t>
+            </a:r>
+          </a:p>
+          <a:p>
+            <a:pPr lvl="1"/>
+            <a:r>
+              <a:rPr lang="en-US" dirty="0"/>
+              <a:t>Log every request duration, we want this to measure our performance </a:t>
+            </a:r>
+            <a:r>
+              <a:rPr lang="en-US" dirty="0">
+                <a:sym typeface="Wingdings" panose="05000000000000000000" pitchFamily="2" charset="2"/>
+              </a:rPr>
+              <a:t></a:t>
+            </a:r>
+            <a:endParaRPr lang="en-US" dirty="0"/>
+          </a:p>
+          <a:p>
+            <a:pPr lvl="1"/>
+            <a:endParaRPr lang="en-US" dirty="0"/>
+          </a:p>
+        </p:txBody>
+      </p:sp>
+      <p:sp>
+        <p:nvSpPr>
+          <p:cNvPr id="4" name="Footer Placeholder 3">
+            <a:extLst>
+              <a:ext uri="{FF2B5EF4-FFF2-40B4-BE49-F238E27FC236}">
+                <a16:creationId xmlns:a16="http://schemas.microsoft.com/office/drawing/2014/main" id="{098447D3-F92B-4607-A138-6F9DA6B4A32F}"/>
+              </a:ext>
+            </a:extLst>
+          </p:cNvPr>
+          <p:cNvSpPr>
+            <a:spLocks noGrp="1"/>
+          </p:cNvSpPr>
+          <p:nvPr>
+            <p:ph type="ftr" sz="quarter" idx="11"/>
+          </p:nvPr>
+        </p:nvSpPr>
+        <p:spPr/>
+        <p:txBody>
+          <a:bodyPr/>
+          <a:lstStyle/>
+          <a:p>
+            <a:r>
+              <a:rPr lang="en-US"/>
+              <a:t>Nodejs Basics</a:t>
+            </a:r>
+            <a:endParaRPr lang="en-US" dirty="0"/>
+          </a:p>
+        </p:txBody>
+      </p:sp>
+      <p:sp>
+        <p:nvSpPr>
+          <p:cNvPr id="5" name="Slide Number Placeholder 4">
+            <a:extLst>
+              <a:ext uri="{FF2B5EF4-FFF2-40B4-BE49-F238E27FC236}">
+                <a16:creationId xmlns:a16="http://schemas.microsoft.com/office/drawing/2014/main" id="{6C8FCFB8-044D-4395-9869-7485523DF77B}"/>
+              </a:ext>
+            </a:extLst>
+          </p:cNvPr>
+          <p:cNvSpPr>
+            <a:spLocks noGrp="1"/>
+          </p:cNvSpPr>
+          <p:nvPr>
+            <p:ph type="sldNum" sz="quarter" idx="12"/>
+          </p:nvPr>
+        </p:nvSpPr>
+        <p:spPr/>
+        <p:txBody>
+          <a:bodyPr/>
+          <a:lstStyle/>
+          <a:p>
+            <a:fld id="{3A98EE3D-8CD1-4C3F-BD1C-C98C9596463C}" type="slidenum">
+              <a:rPr lang="en-US" smtClean="0"/>
+              <a:t>4</a:t>
+            </a:fld>
+            <a:endParaRPr lang="en-US" dirty="0"/>
+          </a:p>
+        </p:txBody>
+      </p:sp>
+    </p:spTree>
+    <p:extLst>
+      <p:ext uri="{BB962C8B-B14F-4D97-AF65-F5344CB8AC3E}">
+        <p14:creationId xmlns:p14="http://schemas.microsoft.com/office/powerpoint/2010/main" val="2545455785"/>
+      </p:ext>
+    </p:extLst>
+  </p:cSld>
+  <p:clrMapOvr>
+    <a:masterClrMapping/>
+  </p:clrMapOvr>
+</p:sld>
+</file>
+
+<file path=ppt/slides/slide5.xml><?xml version="1.0" encoding="utf-8"?>
+<p:sld xmlns:a="http://schemas.openxmlformats.org/drawingml/2006/main" xmlns:r="http://schemas.openxmlformats.org/officeDocument/2006/relationships" xmlns:p="http://schemas.openxmlformats.org/presentationml/2006/main">
+  <p:cSld>
+    <p:spTree>
+      <p:nvGrpSpPr>
+        <p:cNvPr id="1" name=""/>
+        <p:cNvGrpSpPr/>
+        <p:nvPr/>
+      </p:nvGrpSpPr>
+      <p:grpSpPr>
+        <a:xfrm>
+          <a:off x="0" y="0"/>
+          <a:ext cx="0" cy="0"/>
+          <a:chOff x="0" y="0"/>
+          <a:chExt cx="0" cy="0"/>
+        </a:xfrm>
+      </p:grpSpPr>
+      <p:sp>
+        <p:nvSpPr>
+          <p:cNvPr id="2" name="Title 1">
+            <a:extLst>
+              <a:ext uri="{FF2B5EF4-FFF2-40B4-BE49-F238E27FC236}">
+                <a16:creationId xmlns:a16="http://schemas.microsoft.com/office/drawing/2014/main" id="{7C98B97C-3663-43CD-874E-2BB4CE1C8897}"/>
+              </a:ext>
+            </a:extLst>
+          </p:cNvPr>
+          <p:cNvSpPr>
+            <a:spLocks noGrp="1"/>
+          </p:cNvSpPr>
+          <p:nvPr>
+            <p:ph type="title"/>
+          </p:nvPr>
+        </p:nvSpPr>
+        <p:spPr/>
+        <p:txBody>
+          <a:bodyPr/>
+          <a:lstStyle/>
+          <a:p>
+            <a:r>
+              <a:rPr lang="en-US" dirty="0"/>
+              <a:t>Demo</a:t>
+            </a:r>
+          </a:p>
+        </p:txBody>
+      </p:sp>
+      <p:sp>
+        <p:nvSpPr>
+          <p:cNvPr id="3" name="Content Placeholder 2">
+            <a:extLst>
+              <a:ext uri="{FF2B5EF4-FFF2-40B4-BE49-F238E27FC236}">
+                <a16:creationId xmlns:a16="http://schemas.microsoft.com/office/drawing/2014/main" id="{3B721B17-E87C-4130-9BC5-89CE3661FC1D}"/>
+              </a:ext>
+            </a:extLst>
+          </p:cNvPr>
+          <p:cNvSpPr>
+            <a:spLocks noGrp="1"/>
+          </p:cNvSpPr>
+          <p:nvPr>
+            <p:ph idx="1"/>
+          </p:nvPr>
+        </p:nvSpPr>
+        <p:spPr/>
+        <p:txBody>
+          <a:bodyPr/>
+          <a:lstStyle/>
+          <a:p>
+            <a:r>
+              <a:rPr lang="en-US" dirty="0"/>
+              <a:t>Middleware:</a:t>
+            </a:r>
+          </a:p>
+          <a:p>
+            <a:pPr lvl="1"/>
+            <a:r>
+              <a:rPr lang="en-US" dirty="0"/>
+              <a:t>They have access to req and res objects</a:t>
+            </a:r>
+          </a:p>
+          <a:p>
+            <a:pPr lvl="1"/>
+            <a:r>
+              <a:rPr lang="en-US" dirty="0"/>
+              <a:t>Benefits:</a:t>
+            </a:r>
+          </a:p>
+          <a:p>
+            <a:pPr lvl="2"/>
+            <a:r>
+              <a:rPr lang="en-US" dirty="0"/>
+              <a:t>Making changes to req, res</a:t>
+            </a:r>
+          </a:p>
+          <a:p>
+            <a:pPr lvl="2"/>
+            <a:r>
+              <a:rPr lang="en-US" dirty="0"/>
+              <a:t>Ending req, res cycle</a:t>
+            </a:r>
+          </a:p>
+          <a:p>
+            <a:pPr lvl="2"/>
+            <a:r>
+              <a:rPr lang="en-US" dirty="0"/>
+              <a:t>You have to call next method</a:t>
+            </a:r>
+          </a:p>
+          <a:p>
+            <a:pPr lvl="1"/>
+            <a:r>
+              <a:rPr lang="en-US" dirty="0"/>
+              <a:t>How to create them:</a:t>
+            </a:r>
+          </a:p>
+          <a:p>
+            <a:pPr lvl="2"/>
+            <a:r>
+              <a:rPr lang="en-US" dirty="0">
+                <a:latin typeface="Consolas" panose="020B0609020204030204" pitchFamily="49" charset="0"/>
+              </a:rPr>
+              <a:t>nest g middleware &lt;path-to-your-class&gt;</a:t>
+            </a:r>
+          </a:p>
+          <a:p>
+            <a:pPr lvl="1"/>
+            <a:r>
+              <a:rPr lang="en-US" dirty="0"/>
+              <a:t>Function Middlewares are stateless, buy class Middlewares is able to have state</a:t>
+            </a:r>
+          </a:p>
+        </p:txBody>
+      </p:sp>
+      <p:sp>
+        <p:nvSpPr>
+          <p:cNvPr id="4" name="Footer Placeholder 3">
+            <a:extLst>
+              <a:ext uri="{FF2B5EF4-FFF2-40B4-BE49-F238E27FC236}">
+                <a16:creationId xmlns:a16="http://schemas.microsoft.com/office/drawing/2014/main" id="{F1D396F6-5965-4C34-969D-4E0AAC94EBE2}"/>
+              </a:ext>
+            </a:extLst>
+          </p:cNvPr>
+          <p:cNvSpPr>
+            <a:spLocks noGrp="1"/>
+          </p:cNvSpPr>
+          <p:nvPr>
+            <p:ph type="ftr" sz="quarter" idx="11"/>
+          </p:nvPr>
+        </p:nvSpPr>
+        <p:spPr/>
+        <p:txBody>
+          <a:bodyPr/>
+          <a:lstStyle/>
+          <a:p>
+            <a:r>
+              <a:rPr lang="en-US"/>
+              <a:t>Nodejs Basics</a:t>
+            </a:r>
+            <a:endParaRPr lang="en-US" dirty="0"/>
+          </a:p>
+        </p:txBody>
+      </p:sp>
+      <p:sp>
+        <p:nvSpPr>
+          <p:cNvPr id="5" name="Slide Number Placeholder 4">
+            <a:extLst>
+              <a:ext uri="{FF2B5EF4-FFF2-40B4-BE49-F238E27FC236}">
+                <a16:creationId xmlns:a16="http://schemas.microsoft.com/office/drawing/2014/main" id="{DADCC05A-E211-4F4B-9AA9-1CB11FE83FB4}"/>
+              </a:ext>
+            </a:extLst>
+          </p:cNvPr>
+          <p:cNvSpPr>
+            <a:spLocks noGrp="1"/>
+          </p:cNvSpPr>
+          <p:nvPr>
+            <p:ph type="sldNum" sz="quarter" idx="12"/>
+          </p:nvPr>
+        </p:nvSpPr>
+        <p:spPr/>
+        <p:txBody>
+          <a:bodyPr/>
+          <a:lstStyle/>
+          <a:p>
+            <a:fld id="{3A98EE3D-8CD1-4C3F-BD1C-C98C9596463C}" type="slidenum">
+              <a:rPr lang="en-US" smtClean="0"/>
+              <a:t>5</a:t>
+            </a:fld>
+            <a:endParaRPr lang="en-US" dirty="0"/>
+          </a:p>
+        </p:txBody>
+      </p:sp>
+    </p:spTree>
+    <p:extLst>
+      <p:ext uri="{BB962C8B-B14F-4D97-AF65-F5344CB8AC3E}">
+        <p14:creationId xmlns:p14="http://schemas.microsoft.com/office/powerpoint/2010/main" val="3193930332"/>
+      </p:ext>
+    </p:extLst>
+  </p:cSld>
+  <p:clrMapOvr>
+    <a:masterClrMapping/>
+  </p:clrMapOvr>
+</p:sld>
+</file>
+
+<file path=ppt/slides/slide6.xml><?xml version="1.0" encoding="utf-8"?>
+<p:sld xmlns:a="http://schemas.openxmlformats.org/drawingml/2006/main" xmlns:r="http://schemas.openxmlformats.org/officeDocument/2006/relationships" xmlns:p="http://schemas.openxmlformats.org/presentationml/2006/main">
+  <p:cSld>
+    <p:spTree>
+      <p:nvGrpSpPr>
+        <p:cNvPr id="1" name=""/>
+        <p:cNvGrpSpPr/>
+        <p:nvPr/>
+      </p:nvGrpSpPr>
+      <p:grpSpPr>
+        <a:xfrm>
+          <a:off x="0" y="0"/>
+          <a:ext cx="0" cy="0"/>
+          <a:chOff x="0" y="0"/>
+          <a:chExt cx="0" cy="0"/>
+        </a:xfrm>
+      </p:grpSpPr>
+      <p:sp>
+        <p:nvSpPr>
+          <p:cNvPr id="2" name="Title 1">
+            <a:extLst>
+              <a:ext uri="{FF2B5EF4-FFF2-40B4-BE49-F238E27FC236}">
+                <a16:creationId xmlns:a16="http://schemas.microsoft.com/office/drawing/2014/main" id="{60070020-B583-4B9E-9C23-16AB23FD7BDB}"/>
+              </a:ext>
+            </a:extLst>
+          </p:cNvPr>
+          <p:cNvSpPr>
+            <a:spLocks noGrp="1"/>
+          </p:cNvSpPr>
+          <p:nvPr>
+            <p:ph type="title"/>
+          </p:nvPr>
+        </p:nvSpPr>
+        <p:spPr/>
+        <p:txBody>
+          <a:bodyPr/>
+          <a:lstStyle/>
+          <a:p>
+            <a:r>
+              <a:rPr lang="en-US" dirty="0"/>
+              <a:t>Demo</a:t>
+            </a:r>
+          </a:p>
+        </p:txBody>
+      </p:sp>
+      <p:sp>
+        <p:nvSpPr>
+          <p:cNvPr id="3" name="Content Placeholder 2">
+            <a:extLst>
+              <a:ext uri="{FF2B5EF4-FFF2-40B4-BE49-F238E27FC236}">
+                <a16:creationId xmlns:a16="http://schemas.microsoft.com/office/drawing/2014/main" id="{76F2F745-7621-4900-82C9-22402813DCB5}"/>
+              </a:ext>
+            </a:extLst>
+          </p:cNvPr>
+          <p:cNvSpPr>
+            <a:spLocks noGrp="1"/>
+          </p:cNvSpPr>
+          <p:nvPr>
+            <p:ph idx="1"/>
+          </p:nvPr>
+        </p:nvSpPr>
+        <p:spPr/>
+        <p:txBody>
+          <a:bodyPr/>
+          <a:lstStyle/>
+          <a:p>
+            <a:r>
+              <a:rPr lang="en-US" dirty="0"/>
+              <a:t>How to use them?</a:t>
+            </a:r>
+          </a:p>
+          <a:p>
+            <a:pPr lvl="1"/>
+            <a:r>
+              <a:rPr lang="en-US" dirty="0"/>
+              <a:t>Middlewares are not bind to any methods, but instead to routes so</a:t>
+            </a:r>
+          </a:p>
+          <a:p>
+            <a:pPr lvl="2"/>
+            <a:r>
+              <a:rPr lang="en-US" dirty="0"/>
+              <a:t>You can’t inject them, you have to change your module structure as follows</a:t>
+            </a:r>
+          </a:p>
+          <a:p>
+            <a:pPr lvl="1"/>
+            <a:r>
+              <a:rPr lang="en-US" dirty="0"/>
+              <a:t>Implements </a:t>
+            </a:r>
+            <a:r>
+              <a:rPr lang="en-US" dirty="0" err="1"/>
+              <a:t>NestModule</a:t>
+            </a:r>
+            <a:r>
+              <a:rPr lang="en-US" dirty="0"/>
+              <a:t> interface</a:t>
+            </a:r>
+          </a:p>
+          <a:p>
+            <a:pPr lvl="2"/>
+            <a:r>
+              <a:rPr lang="en-US" dirty="0"/>
+              <a:t>Require you to define </a:t>
+            </a:r>
+            <a:r>
+              <a:rPr lang="en-US" dirty="0">
+                <a:latin typeface="Consolas" panose="020B0609020204030204" pitchFamily="49" charset="0"/>
+              </a:rPr>
+              <a:t>configure() </a:t>
+            </a:r>
+            <a:r>
+              <a:rPr lang="en-US" dirty="0"/>
+              <a:t>function with a consumer</a:t>
+            </a:r>
+          </a:p>
+          <a:p>
+            <a:pPr lvl="2"/>
+            <a:r>
+              <a:rPr lang="en-US" dirty="0" err="1">
+                <a:latin typeface="Consolas" panose="020B0609020204030204" pitchFamily="49" charset="0"/>
+              </a:rPr>
+              <a:t>consumer.apply</a:t>
+            </a:r>
+            <a:r>
+              <a:rPr lang="en-US" dirty="0">
+                <a:latin typeface="Consolas" panose="020B0609020204030204" pitchFamily="49" charset="0"/>
+              </a:rPr>
+              <a:t>(your-middleware).</a:t>
+            </a:r>
+            <a:r>
+              <a:rPr lang="en-US" dirty="0" err="1">
+                <a:latin typeface="Consolas" panose="020B0609020204030204" pitchFamily="49" charset="0"/>
+              </a:rPr>
+              <a:t>forRoutes</a:t>
+            </a:r>
+            <a:r>
+              <a:rPr lang="en-US" dirty="0">
+                <a:latin typeface="Consolas" panose="020B0609020204030204" pitchFamily="49" charset="0"/>
+              </a:rPr>
+              <a:t>(‘*’)</a:t>
+            </a:r>
+          </a:p>
+          <a:p>
+            <a:pPr lvl="2"/>
+            <a:r>
+              <a:rPr lang="en-US" dirty="0"/>
+              <a:t>You can </a:t>
+            </a:r>
+            <a:r>
+              <a:rPr lang="en-US" dirty="0">
+                <a:latin typeface="Consolas" panose="020B0609020204030204" pitchFamily="49" charset="0"/>
+              </a:rPr>
+              <a:t>exclude() </a:t>
+            </a:r>
+            <a:r>
+              <a:rPr lang="en-US" dirty="0"/>
+              <a:t>some routes</a:t>
+            </a:r>
+          </a:p>
+          <a:p>
+            <a:r>
+              <a:rPr lang="en-US" dirty="0"/>
+              <a:t>Res object has some useful events</a:t>
+            </a:r>
+          </a:p>
+          <a:p>
+            <a:pPr lvl="1"/>
+            <a:r>
+              <a:rPr lang="en-US" dirty="0"/>
+              <a:t>Add our callback to </a:t>
+            </a:r>
+            <a:r>
+              <a:rPr lang="en-US" sz="1800" dirty="0">
+                <a:latin typeface="Consolas" panose="020B0609020204030204" pitchFamily="49" charset="0"/>
+              </a:rPr>
+              <a:t>finish</a:t>
+            </a:r>
+            <a:r>
+              <a:rPr lang="en-US" dirty="0"/>
+              <a:t> event on res</a:t>
+            </a:r>
+          </a:p>
+        </p:txBody>
+      </p:sp>
+      <p:sp>
+        <p:nvSpPr>
+          <p:cNvPr id="4" name="Footer Placeholder 3">
+            <a:extLst>
+              <a:ext uri="{FF2B5EF4-FFF2-40B4-BE49-F238E27FC236}">
+                <a16:creationId xmlns:a16="http://schemas.microsoft.com/office/drawing/2014/main" id="{98E37E77-EC0E-4CD0-8FC5-ADCDD08502F6}"/>
+              </a:ext>
+            </a:extLst>
+          </p:cNvPr>
+          <p:cNvSpPr>
+            <a:spLocks noGrp="1"/>
+          </p:cNvSpPr>
+          <p:nvPr>
+            <p:ph type="ftr" sz="quarter" idx="11"/>
+          </p:nvPr>
+        </p:nvSpPr>
+        <p:spPr/>
+        <p:txBody>
+          <a:bodyPr/>
+          <a:lstStyle/>
+          <a:p>
+            <a:r>
+              <a:rPr lang="en-US"/>
+              <a:t>Nodejs Basics</a:t>
+            </a:r>
+            <a:endParaRPr lang="en-US" dirty="0"/>
+          </a:p>
+        </p:txBody>
+      </p:sp>
+      <p:sp>
+        <p:nvSpPr>
+          <p:cNvPr id="5" name="Slide Number Placeholder 4">
+            <a:extLst>
+              <a:ext uri="{FF2B5EF4-FFF2-40B4-BE49-F238E27FC236}">
+                <a16:creationId xmlns:a16="http://schemas.microsoft.com/office/drawing/2014/main" id="{A1C9AFEB-A955-463C-940F-72A39F2D653F}"/>
+              </a:ext>
+            </a:extLst>
+          </p:cNvPr>
+          <p:cNvSpPr>
+            <a:spLocks noGrp="1"/>
+          </p:cNvSpPr>
+          <p:nvPr>
+            <p:ph type="sldNum" sz="quarter" idx="12"/>
+          </p:nvPr>
+        </p:nvSpPr>
+        <p:spPr/>
+        <p:txBody>
+          <a:bodyPr/>
+          <a:lstStyle/>
+          <a:p>
+            <a:fld id="{3A98EE3D-8CD1-4C3F-BD1C-C98C9596463C}" type="slidenum">
+              <a:rPr lang="en-US" smtClean="0"/>
+              <a:t>6</a:t>
+            </a:fld>
+            <a:endParaRPr lang="en-US" dirty="0"/>
+          </a:p>
+        </p:txBody>
+      </p:sp>
+    </p:spTree>
+    <p:extLst>
+      <p:ext uri="{BB962C8B-B14F-4D97-AF65-F5344CB8AC3E}">
+        <p14:creationId xmlns:p14="http://schemas.microsoft.com/office/powerpoint/2010/main" val="3784153259"/>
+      </p:ext>
+    </p:extLst>
+  </p:cSld>
+  <p:clrMapOvr>
+    <a:masterClrMapping/>
+  </p:clrMapOvr>
+</p:sld>
+</file>
+
 <file path=ppt/slides/slide7.xml><?xml version="1.0" encoding="utf-8"?>
 <p:sld xmlns:a="http://schemas.openxmlformats.org/drawingml/2006/main" xmlns:r="http://schemas.openxmlformats.org/officeDocument/2006/relationships" xmlns:p="http://schemas.openxmlformats.org/presentationml/2006/main">
   <p:cSld>
@@ -7987,7 +9750,7 @@
           <p:cNvPr id="2" name="Title 1">
             <a:extLst>
               <a:ext uri="{FF2B5EF4-FFF2-40B4-BE49-F238E27FC236}">
-                <a16:creationId xmlns:a16="http://schemas.microsoft.com/office/drawing/2014/main" id="{6B1A0672-14A7-4501-900C-A98EBCCF7AFE}"/>
+                <a16:creationId xmlns:a16="http://schemas.microsoft.com/office/drawing/2014/main" id="{B082CA01-5DCE-45BE-B50E-96EBA7F7356B}"/>
               </a:ext>
             </a:extLst>
           </p:cNvPr>
@@ -8005,7 +9768,7 @@
           <a:p>
             <a:r>
               <a:rPr lang="en-US" dirty="0"/>
-              <a:t>Exercise</a:t>
+              <a:t>New requirement</a:t>
             </a:r>
           </a:p>
         </p:txBody>
@@ -8015,7 +9778,7 @@
           <p:cNvPr id="3" name="Content Placeholder 2">
             <a:extLst>
               <a:ext uri="{FF2B5EF4-FFF2-40B4-BE49-F238E27FC236}">
-                <a16:creationId xmlns:a16="http://schemas.microsoft.com/office/drawing/2014/main" id="{2AEB1BE9-8435-42BF-A4F1-2F148FA9187A}"/>
+                <a16:creationId xmlns:a16="http://schemas.microsoft.com/office/drawing/2014/main" id="{1941F074-39D2-4957-A84D-A874AD3ACBE6}"/>
               </a:ext>
             </a:extLst>
           </p:cNvPr>
@@ -8028,30 +9791,20 @@
         </p:nvSpPr>
         <p:spPr/>
         <p:txBody>
-          <a:bodyPr>
-            <a:normAutofit/>
-          </a:bodyPr>
+          <a:bodyPr/>
           <a:lstStyle/>
           <a:p>
             <a:r>
               <a:rPr lang="en-US" dirty="0"/>
-              <a:t>Required:</a:t>
+              <a:t>Dev:</a:t>
             </a:r>
           </a:p>
           <a:p>
             <a:pPr lvl="1"/>
             <a:r>
               <a:rPr lang="en-US" dirty="0"/>
-              <a:t>Exercise all we speak</a:t>
-            </a:r>
-            <a:endParaRPr lang="fa-IR" dirty="0"/>
-          </a:p>
-          <a:p>
-            <a:r>
-              <a:rPr lang="en-US"/>
-              <a:t>Optional:</a:t>
-            </a:r>
-            <a:endParaRPr lang="en-US" dirty="0"/>
+              <a:t>We use paginated query a lot, create some custom decorator, so use it everywhere we need.</a:t>
+            </a:r>
           </a:p>
         </p:txBody>
       </p:sp>
@@ -8060,7 +9813,7 @@
           <p:cNvPr id="4" name="Footer Placeholder 3">
             <a:extLst>
               <a:ext uri="{FF2B5EF4-FFF2-40B4-BE49-F238E27FC236}">
-                <a16:creationId xmlns:a16="http://schemas.microsoft.com/office/drawing/2014/main" id="{E3C0E9F9-B143-43AD-BD5C-508C3E46FF7B}"/>
+                <a16:creationId xmlns:a16="http://schemas.microsoft.com/office/drawing/2014/main" id="{767DB8AA-E9BA-4AAA-BAB2-EBBFA6A00C8B}"/>
               </a:ext>
             </a:extLst>
           </p:cNvPr>
@@ -8089,7 +9842,7 @@
           <p:cNvPr id="5" name="Slide Number Placeholder 4">
             <a:extLst>
               <a:ext uri="{FF2B5EF4-FFF2-40B4-BE49-F238E27FC236}">
-                <a16:creationId xmlns:a16="http://schemas.microsoft.com/office/drawing/2014/main" id="{1B95C015-BA9F-40C7-A04C-3B835E7354AB}"/>
+                <a16:creationId xmlns:a16="http://schemas.microsoft.com/office/drawing/2014/main" id="{67693A59-B17E-4BED-91B3-70948CAF26C4}"/>
               </a:ext>
             </a:extLst>
           </p:cNvPr>
@@ -8116,7 +9869,347 @@
     </p:spTree>
     <p:extLst>
       <p:ext uri="{BB962C8B-B14F-4D97-AF65-F5344CB8AC3E}">
-        <p14:creationId xmlns:p14="http://schemas.microsoft.com/office/powerpoint/2010/main" val="817859998"/>
+        <p14:creationId xmlns:p14="http://schemas.microsoft.com/office/powerpoint/2010/main" val="3384836891"/>
+      </p:ext>
+    </p:extLst>
+  </p:cSld>
+  <p:clrMapOvr>
+    <a:masterClrMapping/>
+  </p:clrMapOvr>
+</p:sld>
+</file>
+
+<file path=ppt/slides/slide8.xml><?xml version="1.0" encoding="utf-8"?>
+<p:sld xmlns:a="http://schemas.openxmlformats.org/drawingml/2006/main" xmlns:r="http://schemas.openxmlformats.org/officeDocument/2006/relationships" xmlns:p="http://schemas.openxmlformats.org/presentationml/2006/main">
+  <p:cSld>
+    <p:spTree>
+      <p:nvGrpSpPr>
+        <p:cNvPr id="1" name=""/>
+        <p:cNvGrpSpPr/>
+        <p:nvPr/>
+      </p:nvGrpSpPr>
+      <p:grpSpPr>
+        <a:xfrm>
+          <a:off x="0" y="0"/>
+          <a:ext cx="0" cy="0"/>
+          <a:chOff x="0" y="0"/>
+          <a:chExt cx="0" cy="0"/>
+        </a:xfrm>
+      </p:grpSpPr>
+      <p:sp>
+        <p:nvSpPr>
+          <p:cNvPr id="2" name="Title 1">
+            <a:extLst>
+              <a:ext uri="{FF2B5EF4-FFF2-40B4-BE49-F238E27FC236}">
+                <a16:creationId xmlns:a16="http://schemas.microsoft.com/office/drawing/2014/main" id="{6089BE08-519A-44FD-B7D9-49CE847D8752}"/>
+              </a:ext>
+            </a:extLst>
+          </p:cNvPr>
+          <p:cNvSpPr>
+            <a:spLocks noGrp="1"/>
+          </p:cNvSpPr>
+          <p:nvPr>
+            <p:ph type="title"/>
+          </p:nvPr>
+        </p:nvSpPr>
+        <p:spPr/>
+        <p:txBody>
+          <a:bodyPr/>
+          <a:lstStyle/>
+          <a:p>
+            <a:r>
+              <a:rPr lang="en-US" dirty="0"/>
+              <a:t>Demo</a:t>
+            </a:r>
+          </a:p>
+        </p:txBody>
+      </p:sp>
+      <p:sp>
+        <p:nvSpPr>
+          <p:cNvPr id="3" name="Content Placeholder 2">
+            <a:extLst>
+              <a:ext uri="{FF2B5EF4-FFF2-40B4-BE49-F238E27FC236}">
+                <a16:creationId xmlns:a16="http://schemas.microsoft.com/office/drawing/2014/main" id="{FBF2B504-9A66-4AEC-8AC5-6917584AD80B}"/>
+              </a:ext>
+            </a:extLst>
+          </p:cNvPr>
+          <p:cNvSpPr>
+            <a:spLocks noGrp="1"/>
+          </p:cNvSpPr>
+          <p:nvPr>
+            <p:ph idx="1"/>
+          </p:nvPr>
+        </p:nvSpPr>
+        <p:spPr/>
+        <p:txBody>
+          <a:bodyPr/>
+          <a:lstStyle/>
+          <a:p>
+            <a:r>
+              <a:rPr lang="en-US" dirty="0"/>
+              <a:t>Custom decorator</a:t>
+            </a:r>
+          </a:p>
+          <a:p>
+            <a:pPr lvl="1"/>
+            <a:r>
+              <a:rPr lang="en-US" dirty="0" err="1">
+                <a:latin typeface="Consolas" panose="020B0609020204030204" pitchFamily="49" charset="0"/>
+              </a:rPr>
+              <a:t>createParamDecorator</a:t>
+            </a:r>
+            <a:endParaRPr lang="en-US" dirty="0">
+              <a:latin typeface="Consolas" panose="020B0609020204030204" pitchFamily="49" charset="0"/>
+            </a:endParaRPr>
+          </a:p>
+          <a:p>
+            <a:pPr lvl="1"/>
+            <a:r>
+              <a:rPr lang="en-US" dirty="0"/>
+              <a:t>You can access context and therefore request object, </a:t>
+            </a:r>
+            <a:r>
+              <a:rPr lang="en-US" dirty="0" err="1"/>
+              <a:t>Hoora</a:t>
+            </a:r>
+            <a:r>
+              <a:rPr lang="en-US" dirty="0"/>
+              <a:t> </a:t>
+            </a:r>
+            <a:r>
+              <a:rPr lang="en-US" dirty="0">
+                <a:sym typeface="Wingdings" panose="05000000000000000000" pitchFamily="2" charset="2"/>
+              </a:rPr>
+              <a:t></a:t>
+            </a:r>
+            <a:endParaRPr lang="en-US" dirty="0"/>
+          </a:p>
+          <a:p>
+            <a:pPr lvl="1"/>
+            <a:endParaRPr lang="en-US" dirty="0"/>
+          </a:p>
+        </p:txBody>
+      </p:sp>
+      <p:sp>
+        <p:nvSpPr>
+          <p:cNvPr id="4" name="Footer Placeholder 3">
+            <a:extLst>
+              <a:ext uri="{FF2B5EF4-FFF2-40B4-BE49-F238E27FC236}">
+                <a16:creationId xmlns:a16="http://schemas.microsoft.com/office/drawing/2014/main" id="{00942C8F-9226-4114-A716-7D91F44B469C}"/>
+              </a:ext>
+            </a:extLst>
+          </p:cNvPr>
+          <p:cNvSpPr>
+            <a:spLocks noGrp="1"/>
+          </p:cNvSpPr>
+          <p:nvPr>
+            <p:ph type="ftr" sz="quarter" idx="11"/>
+          </p:nvPr>
+        </p:nvSpPr>
+        <p:spPr/>
+        <p:txBody>
+          <a:bodyPr/>
+          <a:lstStyle/>
+          <a:p>
+            <a:r>
+              <a:rPr lang="en-US"/>
+              <a:t>Nodejs Basics</a:t>
+            </a:r>
+            <a:endParaRPr lang="en-US" dirty="0"/>
+          </a:p>
+        </p:txBody>
+      </p:sp>
+      <p:sp>
+        <p:nvSpPr>
+          <p:cNvPr id="5" name="Slide Number Placeholder 4">
+            <a:extLst>
+              <a:ext uri="{FF2B5EF4-FFF2-40B4-BE49-F238E27FC236}">
+                <a16:creationId xmlns:a16="http://schemas.microsoft.com/office/drawing/2014/main" id="{151C90F0-BADA-4985-A06E-48B79426FBB6}"/>
+              </a:ext>
+            </a:extLst>
+          </p:cNvPr>
+          <p:cNvSpPr>
+            <a:spLocks noGrp="1"/>
+          </p:cNvSpPr>
+          <p:nvPr>
+            <p:ph type="sldNum" sz="quarter" idx="12"/>
+          </p:nvPr>
+        </p:nvSpPr>
+        <p:spPr/>
+        <p:txBody>
+          <a:bodyPr/>
+          <a:lstStyle/>
+          <a:p>
+            <a:fld id="{3A98EE3D-8CD1-4C3F-BD1C-C98C9596463C}" type="slidenum">
+              <a:rPr lang="en-US" smtClean="0"/>
+              <a:t>8</a:t>
+            </a:fld>
+            <a:endParaRPr lang="en-US" dirty="0"/>
+          </a:p>
+        </p:txBody>
+      </p:sp>
+    </p:spTree>
+    <p:extLst>
+      <p:ext uri="{BB962C8B-B14F-4D97-AF65-F5344CB8AC3E}">
+        <p14:creationId xmlns:p14="http://schemas.microsoft.com/office/powerpoint/2010/main" val="2200865574"/>
+      </p:ext>
+    </p:extLst>
+  </p:cSld>
+  <p:clrMapOvr>
+    <a:masterClrMapping/>
+  </p:clrMapOvr>
+</p:sld>
+</file>
+
+<file path=ppt/slides/slide9.xml><?xml version="1.0" encoding="utf-8"?>
+<p:sld xmlns:a="http://schemas.openxmlformats.org/drawingml/2006/main" xmlns:r="http://schemas.openxmlformats.org/officeDocument/2006/relationships" xmlns:p="http://schemas.openxmlformats.org/presentationml/2006/main">
+  <p:cSld>
+    <p:spTree>
+      <p:nvGrpSpPr>
+        <p:cNvPr id="1" name=""/>
+        <p:cNvGrpSpPr/>
+        <p:nvPr/>
+      </p:nvGrpSpPr>
+      <p:grpSpPr>
+        <a:xfrm>
+          <a:off x="0" y="0"/>
+          <a:ext cx="0" cy="0"/>
+          <a:chOff x="0" y="0"/>
+          <a:chExt cx="0" cy="0"/>
+        </a:xfrm>
+      </p:grpSpPr>
+      <p:sp>
+        <p:nvSpPr>
+          <p:cNvPr id="2" name="Title 1">
+            <a:extLst>
+              <a:ext uri="{FF2B5EF4-FFF2-40B4-BE49-F238E27FC236}">
+                <a16:creationId xmlns:a16="http://schemas.microsoft.com/office/drawing/2014/main" id="{0592AF48-171E-4D52-913B-4E6470C2D3AE}"/>
+              </a:ext>
+            </a:extLst>
+          </p:cNvPr>
+          <p:cNvSpPr>
+            <a:spLocks noGrp="1"/>
+          </p:cNvSpPr>
+          <p:nvPr>
+            <p:ph type="title"/>
+          </p:nvPr>
+        </p:nvSpPr>
+        <p:spPr/>
+        <p:txBody>
+          <a:bodyPr/>
+          <a:lstStyle/>
+          <a:p>
+            <a:r>
+              <a:rPr lang="en-US" dirty="0"/>
+              <a:t>New important requirement</a:t>
+            </a:r>
+          </a:p>
+        </p:txBody>
+      </p:sp>
+      <p:sp>
+        <p:nvSpPr>
+          <p:cNvPr id="3" name="Content Placeholder 2">
+            <a:extLst>
+              <a:ext uri="{FF2B5EF4-FFF2-40B4-BE49-F238E27FC236}">
+                <a16:creationId xmlns:a16="http://schemas.microsoft.com/office/drawing/2014/main" id="{E2D93821-08FC-494D-82A1-5711AA9A58AD}"/>
+              </a:ext>
+            </a:extLst>
+          </p:cNvPr>
+          <p:cNvSpPr>
+            <a:spLocks noGrp="1"/>
+          </p:cNvSpPr>
+          <p:nvPr>
+            <p:ph idx="1"/>
+          </p:nvPr>
+        </p:nvSpPr>
+        <p:spPr/>
+        <p:txBody>
+          <a:bodyPr/>
+          <a:lstStyle/>
+          <a:p>
+            <a:r>
+              <a:rPr lang="en-US" dirty="0"/>
+              <a:t>Your frontend:</a:t>
+            </a:r>
+          </a:p>
+          <a:p>
+            <a:pPr lvl="1"/>
+            <a:r>
+              <a:rPr lang="en-US" dirty="0"/>
+              <a:t>Please, provide a documentation for me, to know how to work with your backend </a:t>
+            </a:r>
+            <a:r>
+              <a:rPr lang="en-US" dirty="0">
+                <a:sym typeface="Wingdings" panose="05000000000000000000" pitchFamily="2" charset="2"/>
+              </a:rPr>
+              <a:t></a:t>
+            </a:r>
+            <a:endParaRPr lang="en-US" dirty="0"/>
+          </a:p>
+        </p:txBody>
+      </p:sp>
+      <p:sp>
+        <p:nvSpPr>
+          <p:cNvPr id="4" name="Footer Placeholder 3">
+            <a:extLst>
+              <a:ext uri="{FF2B5EF4-FFF2-40B4-BE49-F238E27FC236}">
+                <a16:creationId xmlns:a16="http://schemas.microsoft.com/office/drawing/2014/main" id="{38E47E58-B72C-4F9C-8F85-C60AAE431069}"/>
+              </a:ext>
+            </a:extLst>
+          </p:cNvPr>
+          <p:cNvSpPr>
+            <a:spLocks noGrp="1"/>
+          </p:cNvSpPr>
+          <p:nvPr>
+            <p:ph type="ftr" sz="quarter" idx="11"/>
+          </p:nvPr>
+        </p:nvSpPr>
+        <p:spPr/>
+        <p:txBody>
+          <a:bodyPr/>
+          <a:lstStyle/>
+          <a:p>
+            <a:r>
+              <a:rPr lang="en-US"/>
+              <a:t>Nodejs Basics</a:t>
+            </a:r>
+            <a:endParaRPr lang="en-US" dirty="0"/>
+          </a:p>
+        </p:txBody>
+      </p:sp>
+      <p:sp>
+        <p:nvSpPr>
+          <p:cNvPr id="5" name="Slide Number Placeholder 4">
+            <a:extLst>
+              <a:ext uri="{FF2B5EF4-FFF2-40B4-BE49-F238E27FC236}">
+                <a16:creationId xmlns:a16="http://schemas.microsoft.com/office/drawing/2014/main" id="{9B5E8EB6-B320-4B91-B678-2046E169BA7F}"/>
+              </a:ext>
+            </a:extLst>
+          </p:cNvPr>
+          <p:cNvSpPr>
+            <a:spLocks noGrp="1"/>
+          </p:cNvSpPr>
+          <p:nvPr>
+            <p:ph type="sldNum" sz="quarter" idx="12"/>
+          </p:nvPr>
+        </p:nvSpPr>
+        <p:spPr/>
+        <p:txBody>
+          <a:bodyPr/>
+          <a:lstStyle/>
+          <a:p>
+            <a:fld id="{3A98EE3D-8CD1-4C3F-BD1C-C98C9596463C}" type="slidenum">
+              <a:rPr lang="en-US" smtClean="0"/>
+              <a:t>9</a:t>
+            </a:fld>
+            <a:endParaRPr lang="en-US" dirty="0"/>
+          </a:p>
+        </p:txBody>
+      </p:sp>
+    </p:spTree>
+    <p:extLst>
+      <p:ext uri="{BB962C8B-B14F-4D97-AF65-F5344CB8AC3E}">
+        <p14:creationId xmlns:p14="http://schemas.microsoft.com/office/powerpoint/2010/main" val="2140574549"/>
       </p:ext>
     </p:extLst>
   </p:cSld>

</xml_diff>